<commit_message>
added section on ggplot
</commit_message>
<xml_diff>
--- a/RQuickRef.pptx
+++ b/RQuickRef.pptx
@@ -9438,7 +9438,7 @@
           <a:p>
             <a:pPr>
               <a:tabLst>
-                <a:tab pos="3778250" algn="r"/>
+                <a:tab pos="3943350" algn="r"/>
               </a:tabLst>
             </a:pPr>
             <a:r>
@@ -9452,7 +9452,7 @@
           <a:p>
             <a:pPr>
               <a:tabLst>
-                <a:tab pos="3778250" algn="r"/>
+                <a:tab pos="3943350" algn="r"/>
               </a:tabLst>
             </a:pPr>
             <a:r>
@@ -9473,7 +9473,7 @@
           <a:p>
             <a:pPr>
               <a:tabLst>
-                <a:tab pos="3778250" algn="r"/>
+                <a:tab pos="3943350" algn="r"/>
               </a:tabLst>
             </a:pPr>
             <a:r>
@@ -9501,7 +9501,7 @@
           <a:p>
             <a:pPr>
               <a:tabLst>
-                <a:tab pos="3778250" algn="r"/>
+                <a:tab pos="3943350" algn="r"/>
               </a:tabLst>
             </a:pPr>
             <a:r>
@@ -9536,7 +9536,7 @@
           <a:p>
             <a:pPr>
               <a:tabLst>
-                <a:tab pos="3778250" algn="r"/>
+                <a:tab pos="3943350" algn="r"/>
               </a:tabLst>
             </a:pPr>
             <a:r>
@@ -9544,14 +9544,7 @@
                 <a:latin typeface="Helvetica"/>
                 <a:cs typeface="Helvetica"/>
               </a:rPr>
-              <a:t>Combine </a:t>
-            </a:r>
-            <a:r>
-              <a:rPr lang="en-US" sz="1000" dirty="0" smtClean="0">
-                <a:latin typeface="Helvetica"/>
-                <a:cs typeface="Helvetica"/>
-              </a:rPr>
-              <a:t>vectors by columns	</a:t>
+              <a:t>Combine vectors by columns	</a:t>
             </a:r>
             <a:r>
               <a:rPr lang="en-US" sz="1000" dirty="0" err="1" smtClean="0">
@@ -9571,7 +9564,7 @@
           <a:p>
             <a:pPr>
               <a:tabLst>
-                <a:tab pos="3778250" algn="r"/>
+                <a:tab pos="3943350" algn="r"/>
               </a:tabLst>
             </a:pPr>
             <a:r>
@@ -9603,7 +9596,7 @@
           <a:p>
             <a:pPr>
               <a:tabLst>
-                <a:tab pos="3778250" algn="r"/>
+                <a:tab pos="3943350" algn="r"/>
               </a:tabLst>
             </a:pPr>
             <a:r>
@@ -9663,7 +9656,7 @@
           <a:p>
             <a:pPr>
               <a:tabLst>
-                <a:tab pos="3778250" algn="r"/>
+                <a:tab pos="3943350" algn="r"/>
               </a:tabLst>
             </a:pPr>
             <a:r>
@@ -9705,7 +9698,7 @@
           <a:p>
             <a:pPr>
               <a:tabLst>
-                <a:tab pos="3778250" algn="r"/>
+                <a:tab pos="3943350" algn="r"/>
               </a:tabLst>
             </a:pPr>
             <a:endParaRPr lang="en-US" sz="1000" dirty="0" smtClean="0">
@@ -9716,7 +9709,7 @@
           <a:p>
             <a:pPr>
               <a:tabLst>
-                <a:tab pos="3778250" algn="r"/>
+                <a:tab pos="3943350" algn="r"/>
               </a:tabLst>
             </a:pPr>
             <a:r>
@@ -9730,7 +9723,7 @@
           <a:p>
             <a:pPr>
               <a:tabLst>
-                <a:tab pos="3778250" algn="r"/>
+                <a:tab pos="3943350" algn="r"/>
               </a:tabLst>
             </a:pPr>
             <a:r>
@@ -9751,7 +9744,7 @@
           <a:p>
             <a:pPr>
               <a:tabLst>
-                <a:tab pos="3778250" algn="r"/>
+                <a:tab pos="3943350" algn="r"/>
               </a:tabLst>
             </a:pPr>
             <a:r>
@@ -9779,7 +9772,7 @@
           <a:p>
             <a:pPr>
               <a:tabLst>
-                <a:tab pos="3778250" algn="r"/>
+                <a:tab pos="3943350" algn="r"/>
               </a:tabLst>
             </a:pPr>
             <a:r>
@@ -9811,7 +9804,7 @@
           <a:p>
             <a:pPr>
               <a:tabLst>
-                <a:tab pos="3778250" algn="r"/>
+                <a:tab pos="3943350" algn="r"/>
               </a:tabLst>
             </a:pPr>
             <a:endParaRPr lang="en-US" sz="1000" baseline="30000" dirty="0" smtClean="0">
@@ -9822,7 +9815,7 @@
           <a:p>
             <a:pPr>
               <a:tabLst>
-                <a:tab pos="3778250" algn="r"/>
+                <a:tab pos="3943350" algn="r"/>
               </a:tabLst>
             </a:pPr>
             <a:r>
@@ -9836,7 +9829,7 @@
           <a:p>
             <a:pPr>
               <a:tabLst>
-                <a:tab pos="3778250" algn="r"/>
+                <a:tab pos="3943350" algn="r"/>
               </a:tabLst>
             </a:pPr>
             <a:r>
@@ -9931,7 +9924,7 @@
           <a:p>
             <a:pPr>
               <a:tabLst>
-                <a:tab pos="3778250" algn="r"/>
+                <a:tab pos="3943350" algn="r"/>
               </a:tabLst>
             </a:pPr>
             <a:r>
@@ -9973,7 +9966,7 @@
           <a:p>
             <a:pPr>
               <a:tabLst>
-                <a:tab pos="3778250" algn="r"/>
+                <a:tab pos="3943350" algn="r"/>
               </a:tabLst>
             </a:pPr>
             <a:r>
@@ -10015,7 +10008,7 @@
           <a:p>
             <a:pPr>
               <a:tabLst>
-                <a:tab pos="3778250" algn="r"/>
+                <a:tab pos="3943350" algn="r"/>
               </a:tabLst>
             </a:pPr>
             <a:r>
@@ -10050,7 +10043,7 @@
           <a:p>
             <a:pPr>
               <a:tabLst>
-                <a:tab pos="3778250" algn="r"/>
+                <a:tab pos="3943350" algn="r"/>
               </a:tabLst>
             </a:pPr>
             <a:endParaRPr lang="en-US" sz="1000" b="1" dirty="0">
@@ -10061,7 +10054,7 @@
           <a:p>
             <a:pPr>
               <a:tabLst>
-                <a:tab pos="3778250" algn="r"/>
+                <a:tab pos="3943350" algn="r"/>
               </a:tabLst>
             </a:pPr>
             <a:r>
@@ -10086,7 +10079,7 @@
           <a:p>
             <a:pPr>
               <a:tabLst>
-                <a:tab pos="3778250" algn="r"/>
+                <a:tab pos="3943350" algn="r"/>
               </a:tabLst>
             </a:pPr>
             <a:r>
@@ -10107,7 +10100,7 @@
           <a:p>
             <a:pPr>
               <a:tabLst>
-                <a:tab pos="3778250" algn="r"/>
+                <a:tab pos="3943350" algn="r"/>
               </a:tabLst>
             </a:pPr>
             <a:r>
@@ -10115,14 +10108,7 @@
                 <a:latin typeface="Helvetica"/>
                 <a:cs typeface="Helvetica"/>
               </a:rPr>
-              <a:t>Get </a:t>
-            </a:r>
-            <a:r>
-              <a:rPr lang="en-US" sz="1000" dirty="0" smtClean="0">
-                <a:latin typeface="Helvetica"/>
-                <a:cs typeface="Helvetica"/>
-              </a:rPr>
-              <a:t>column by name	</a:t>
+              <a:t>Get column by name	</a:t>
             </a:r>
             <a:r>
               <a:rPr lang="en-US" sz="1000" dirty="0" err="1" smtClean="0">
@@ -10139,7 +10125,7 @@
           <a:p>
             <a:pPr>
               <a:tabLst>
-                <a:tab pos="3778250" algn="r"/>
+                <a:tab pos="3943350" algn="r"/>
               </a:tabLst>
             </a:pPr>
             <a:r>
@@ -10188,7 +10174,7 @@
           <a:p>
             <a:pPr>
               <a:tabLst>
-                <a:tab pos="3778250" algn="r"/>
+                <a:tab pos="3943350" algn="r"/>
               </a:tabLst>
             </a:pPr>
             <a:r>
@@ -10223,7 +10209,7 @@
           <a:p>
             <a:pPr>
               <a:tabLst>
-                <a:tab pos="3778250" algn="r"/>
+                <a:tab pos="3943350" algn="r"/>
               </a:tabLst>
             </a:pPr>
             <a:r>
@@ -10293,7 +10279,7 @@
           <a:p>
             <a:pPr>
               <a:tabLst>
-                <a:tab pos="3778250" algn="r"/>
+                <a:tab pos="3943350" algn="r"/>
               </a:tabLst>
             </a:pPr>
             <a:r>
@@ -10342,7 +10328,7 @@
           <a:p>
             <a:pPr>
               <a:tabLst>
-                <a:tab pos="3778250" algn="r"/>
+                <a:tab pos="3943350" algn="r"/>
               </a:tabLst>
             </a:pPr>
             <a:endParaRPr lang="en-US" sz="1000" b="1" dirty="0" smtClean="0">
@@ -10353,7 +10339,7 @@
           <a:p>
             <a:pPr>
               <a:tabLst>
-                <a:tab pos="3778250" algn="r"/>
+                <a:tab pos="3943350" algn="r"/>
               </a:tabLst>
             </a:pPr>
             <a:r>
@@ -10374,7 +10360,7 @@
           <a:p>
             <a:pPr>
               <a:tabLst>
-                <a:tab pos="3778250" algn="r"/>
+                <a:tab pos="3943350" algn="r"/>
               </a:tabLst>
             </a:pPr>
             <a:r>
@@ -10392,7 +10378,7 @@
           <a:p>
             <a:pPr>
               <a:tabLst>
-                <a:tab pos="3778250" algn="r"/>
+                <a:tab pos="3943350" algn="r"/>
               </a:tabLst>
             </a:pPr>
             <a:r>
@@ -10420,7 +10406,7 @@
           <a:p>
             <a:pPr>
               <a:tabLst>
-                <a:tab pos="3778250" algn="r"/>
+                <a:tab pos="3943350" algn="r"/>
               </a:tabLst>
             </a:pPr>
             <a:r>
@@ -10442,14 +10428,7 @@
                 <a:latin typeface="Helvetica"/>
                 <a:cs typeface="Helvetica"/>
               </a:rPr>
-              <a:t>criterion, such as subjects that are above a certain age, all measurements taken in a drug trial before treatment, </a:t>
-            </a:r>
-            <a:r>
-              <a:rPr lang="en-US" sz="900" dirty="0" smtClean="0">
-                <a:latin typeface="Helvetica"/>
-                <a:cs typeface="Helvetica"/>
-              </a:rPr>
-              <a:t>etc.</a:t>
+              <a:t>criterion, such as subjects that are above a certain age, all measurements taken in a drug trial before treatment, etc.</a:t>
             </a:r>
           </a:p>
         </p:txBody>
@@ -11421,7 +11400,53 @@
             <a:pPr algn="ctr"/>
             <a:r>
               <a:rPr lang="en-US" dirty="0" smtClean="0"/>
-              <a:t>Missing ANOVA, length</a:t>
+              <a:t>Missing ANOVA, </a:t>
+            </a:r>
+            <a:r>
+              <a:rPr lang="en-US" dirty="0" smtClean="0"/>
+              <a:t>length, %in%</a:t>
+            </a:r>
+            <a:endParaRPr lang="en-US" dirty="0"/>
+          </a:p>
+        </p:txBody>
+      </p:sp>
+      <p:sp>
+        <p:nvSpPr>
+          <p:cNvPr id="16" name="Rectangle 15"/>
+          <p:cNvSpPr/>
+          <p:nvPr/>
+        </p:nvSpPr>
+        <p:spPr>
+          <a:xfrm>
+            <a:off x="6257774" y="8633703"/>
+            <a:ext cx="2151324" cy="1171489"/>
+          </a:xfrm>
+          <a:prstGeom prst="rect">
+            <a:avLst/>
+          </a:prstGeom>
+        </p:spPr>
+        <p:style>
+          <a:lnRef idx="1">
+            <a:schemeClr val="accent1"/>
+          </a:lnRef>
+          <a:fillRef idx="3">
+            <a:schemeClr val="accent1"/>
+          </a:fillRef>
+          <a:effectRef idx="2">
+            <a:schemeClr val="accent1"/>
+          </a:effectRef>
+          <a:fontRef idx="minor">
+            <a:schemeClr val="lt1"/>
+          </a:fontRef>
+        </p:style>
+        <p:txBody>
+          <a:bodyPr rtlCol="0" anchor="ctr"/>
+          <a:lstStyle/>
+          <a:p>
+            <a:pPr algn="ctr"/>
+            <a:r>
+              <a:rPr lang="en-US" dirty="0" smtClean="0"/>
+              <a:t>Move model commands to a different section?</a:t>
             </a:r>
             <a:endParaRPr lang="en-US" dirty="0"/>
           </a:p>
@@ -11481,7 +11506,7 @@
           <a:ln w="12700" cmpd="sng">
             <a:solidFill>
               <a:schemeClr val="bg1">
-                <a:lumMod val="85000"/>
+                <a:lumMod val="65000"/>
               </a:schemeClr>
             </a:solidFill>
           </a:ln>
@@ -11528,9 +11553,7 @@
           </a:prstGeom>
           <a:ln w="12700" cmpd="sng">
             <a:solidFill>
-              <a:schemeClr val="bg1">
-                <a:lumMod val="85000"/>
-              </a:schemeClr>
+              <a:srgbClr val="A6A6A6"/>
             </a:solidFill>
           </a:ln>
         </p:spPr>
@@ -11569,7 +11592,7 @@
         <p:spPr>
           <a:xfrm>
             <a:off x="235361" y="230904"/>
-            <a:ext cx="3541112" cy="226295"/>
+            <a:ext cx="3541111" cy="226295"/>
           </a:xfrm>
           <a:prstGeom prst="rect">
             <a:avLst/>
@@ -11651,7 +11674,7 @@
                 <a:latin typeface="Helvetica"/>
                 <a:cs typeface="Helvetica"/>
               </a:rPr>
-              <a:t>Sampling from distributions</a:t>
+              <a:t>More statistics</a:t>
             </a:r>
             <a:endParaRPr lang="en-US" sz="1200" b="1" dirty="0">
               <a:latin typeface="Helvetica"/>
@@ -11790,11 +11813,7 @@
           <a:p>
             <a:r>
               <a:rPr lang="en-US" dirty="0" smtClean="0"/>
-              <a:t>if, for, </a:t>
-            </a:r>
-            <a:r>
-              <a:rPr lang="en-US" dirty="0" smtClean="0"/>
-              <a:t>while</a:t>
+              <a:t>if, for, while</a:t>
             </a:r>
           </a:p>
           <a:p>
@@ -11808,7 +11827,6 @@
               <a:rPr lang="en-US" dirty="0" smtClean="0"/>
               <a:t>Paste, attach, detach, with, by</a:t>
             </a:r>
-            <a:endParaRPr lang="en-US" dirty="0" smtClean="0"/>
           </a:p>
         </p:txBody>
       </p:sp>
@@ -11820,8 +11838,8 @@
         </p:nvSpPr>
         <p:spPr>
           <a:xfrm>
-            <a:off x="4730508" y="5058288"/>
-            <a:ext cx="2539871" cy="246221"/>
+            <a:off x="4000304" y="3536828"/>
+            <a:ext cx="3541112" cy="1323439"/>
           </a:xfrm>
           <a:prstGeom prst="rect">
             <a:avLst/>
@@ -11835,33 +11853,70 @@
           <a:lstStyle/>
           <a:p>
             <a:r>
-              <a:rPr lang="en-US" sz="1000" dirty="0" err="1" smtClean="0">
+              <a:rPr lang="en-US" sz="1000" b="1" dirty="0" smtClean="0">
                 <a:latin typeface="Helvetica"/>
                 <a:cs typeface="Helvetica"/>
               </a:rPr>
-              <a:t>qnorm</a:t>
-            </a:r>
+              <a:t>Sampling from distributions</a:t>
+            </a:r>
+          </a:p>
+          <a:p>
+            <a:endParaRPr lang="en-US" sz="1000" b="1" dirty="0">
+              <a:latin typeface="Helvetica"/>
+              <a:cs typeface="Helvetica"/>
+            </a:endParaRPr>
+          </a:p>
+          <a:p>
+            <a:r>
+              <a:rPr lang="en-US" sz="1000" b="1" dirty="0" smtClean="0">
+                <a:latin typeface="Helvetica"/>
+                <a:cs typeface="Helvetica"/>
+              </a:rPr>
+              <a:t>Modeling dataset</a:t>
+            </a:r>
+          </a:p>
+          <a:p>
             <a:r>
               <a:rPr lang="en-US" sz="1000" dirty="0" smtClean="0">
                 <a:latin typeface="Helvetica"/>
                 <a:cs typeface="Helvetica"/>
               </a:rPr>
-              <a:t>, </a:t>
-            </a:r>
-            <a:r>
-              <a:rPr lang="en-US" sz="1000" dirty="0" err="1" smtClean="0">
-                <a:latin typeface="Helvetica"/>
-                <a:cs typeface="Helvetica"/>
-              </a:rPr>
-              <a:t>rnorm</a:t>
-            </a:r>
+              <a:t>Simple linear model</a:t>
+            </a:r>
+          </a:p>
+          <a:p>
+            <a:endParaRPr lang="en-US" sz="1000" dirty="0">
+              <a:latin typeface="Helvetica"/>
+              <a:cs typeface="Helvetica"/>
+            </a:endParaRPr>
+          </a:p>
+          <a:p>
             <a:r>
               <a:rPr lang="en-US" sz="1000" dirty="0" smtClean="0">
                 <a:latin typeface="Helvetica"/>
                 <a:cs typeface="Helvetica"/>
               </a:rPr>
-              <a:t>, etc.</a:t>
-            </a:r>
+              <a:t>Logistic regression</a:t>
+            </a:r>
+          </a:p>
+          <a:p>
+            <a:endParaRPr lang="en-US" sz="1000" dirty="0">
+              <a:latin typeface="Helvetica"/>
+              <a:cs typeface="Helvetica"/>
+            </a:endParaRPr>
+          </a:p>
+          <a:p>
+            <a:r>
+              <a:rPr lang="en-US" sz="1000" dirty="0" smtClean="0">
+                <a:latin typeface="Helvetica"/>
+                <a:cs typeface="Helvetica"/>
+              </a:rPr>
+              <a:t>Mixed-effects model</a:t>
+            </a:r>
+            <a:endParaRPr lang="en-US" sz="1000" dirty="0">
+              <a:latin typeface="Helvetica"/>
+              <a:cs typeface="Helvetica"/>
+            </a:endParaRPr>
           </a:p>
         </p:txBody>
       </p:sp>
@@ -11874,7 +11929,7 @@
         <p:spPr>
           <a:xfrm>
             <a:off x="235361" y="457199"/>
-            <a:ext cx="3541113" cy="6093976"/>
+            <a:ext cx="3541113" cy="9448740"/>
           </a:xfrm>
           <a:prstGeom prst="rect">
             <a:avLst/>
@@ -11923,17 +11978,30 @@
             </a:r>
             <a:r>
               <a:rPr lang="en-US" sz="1000" b="1" dirty="0" smtClean="0">
+                <a:solidFill>
+                  <a:srgbClr val="F15E5D"/>
+                </a:solidFill>
                 <a:latin typeface="Helvetica"/>
                 <a:cs typeface="Helvetica"/>
               </a:rPr>
               <a:t>dataset</a:t>
+            </a:r>
+            <a:r>
+              <a:rPr lang="en-US" sz="1000" dirty="0" smtClean="0">
+                <a:solidFill>
+                  <a:srgbClr val="F15E5D"/>
+                </a:solidFill>
+                <a:latin typeface="Helvetica"/>
+                <a:cs typeface="Helvetica"/>
+              </a:rPr>
+              <a:t> </a:t>
             </a:r>
             <a:r>
               <a:rPr lang="en-US" sz="1000" dirty="0" smtClean="0">
                 <a:latin typeface="Helvetica"/>
                 <a:cs typeface="Helvetica"/>
               </a:rPr>
-              <a:t> to plot</a:t>
+              <a:t>to plot</a:t>
             </a:r>
           </a:p>
           <a:p>
@@ -11950,6 +12018,9 @@
             </a:r>
             <a:r>
               <a:rPr lang="en-US" sz="1000" b="1" dirty="0" err="1" smtClean="0">
+                <a:solidFill>
+                  <a:srgbClr val="5289FB"/>
+                </a:solidFill>
                 <a:latin typeface="Helvetica"/>
                 <a:cs typeface="Helvetica"/>
               </a:rPr>
@@ -11957,6 +12028,9 @@
             </a:r>
             <a:r>
               <a:rPr lang="en-US" sz="1000" b="1" dirty="0" smtClean="0">
+                <a:solidFill>
+                  <a:srgbClr val="5289FB"/>
+                </a:solidFill>
                 <a:latin typeface="Helvetica"/>
                 <a:cs typeface="Helvetica"/>
               </a:rPr>
@@ -11981,62 +12055,6 @@
                 <a:cs typeface="Helvetica"/>
               </a:rPr>
               <a:t>Using </a:t>
-            </a:r>
-            <a:r>
-              <a:rPr lang="en-US" sz="1000" b="1" dirty="0" smtClean="0">
-                <a:latin typeface="Helvetica"/>
-                <a:cs typeface="Helvetica"/>
-              </a:rPr>
-              <a:t>aesthetic mappings </a:t>
-            </a:r>
-            <a:r>
-              <a:rPr lang="en-US" sz="1000" dirty="0" smtClean="0">
-                <a:latin typeface="Helvetica"/>
-                <a:cs typeface="Helvetica"/>
-              </a:rPr>
-              <a:t>to specify how different properties of the dataset will appear on the plot. The most basic of these is choosing which variables will appear on the x and y axis.</a:t>
-            </a:r>
-            <a:endParaRPr lang="en-US" sz="1000" dirty="0">
-              <a:latin typeface="Helvetica"/>
-              <a:cs typeface="Helvetica"/>
-            </a:endParaRPr>
-          </a:p>
-          <a:p>
-            <a:endParaRPr lang="en-US" sz="1000" b="1" dirty="0" smtClean="0">
-              <a:latin typeface="Helvetica"/>
-              <a:cs typeface="Helvetica"/>
-            </a:endParaRPr>
-          </a:p>
-          <a:p>
-            <a:r>
-              <a:rPr lang="en-US" sz="1000" b="1" dirty="0" smtClean="0">
-                <a:latin typeface="Helvetica"/>
-                <a:cs typeface="Helvetica"/>
-              </a:rPr>
-              <a:t>Basic syntax</a:t>
-            </a:r>
-            <a:endParaRPr lang="en-US" sz="1000" dirty="0">
-              <a:latin typeface="Helvetica"/>
-              <a:cs typeface="Helvetica"/>
-            </a:endParaRPr>
-          </a:p>
-          <a:p>
-            <a:r>
-              <a:rPr lang="en-US" sz="1000" dirty="0" smtClean="0">
-                <a:latin typeface="Helvetica"/>
-                <a:cs typeface="Helvetica"/>
-              </a:rPr>
-              <a:t>	 </a:t>
-            </a:r>
-            <a:r>
-              <a:rPr lang="en-US" sz="1000" dirty="0" smtClean="0">
-                <a:solidFill>
-                  <a:srgbClr val="008000"/>
-                </a:solidFill>
-                <a:latin typeface="Helvetica"/>
-                <a:cs typeface="Helvetica"/>
-              </a:rPr>
-              <a:t> </a:t>
             </a:r>
             <a:r>
               <a:rPr lang="en-US" sz="1000" b="1" dirty="0" smtClean="0">
@@ -12046,24 +12064,113 @@
                 <a:latin typeface="Helvetica"/>
                 <a:cs typeface="Helvetica"/>
               </a:rPr>
-              <a:t>Aesthetic mappings</a:t>
-            </a:r>
+              <a:t>aesthetic mappings </a:t>
+            </a:r>
+            <a:r>
+              <a:rPr lang="en-US" sz="1000" dirty="0" smtClean="0">
+                <a:latin typeface="Helvetica"/>
+                <a:cs typeface="Helvetica"/>
+              </a:rPr>
+              <a:t>to specify how different properties of the dataset will appear on the plot. The most basic of these is choosing which variables will appear on the x and y </a:t>
+            </a:r>
+            <a:r>
+              <a:rPr lang="en-US" sz="1000" dirty="0" smtClean="0">
+                <a:latin typeface="Helvetica"/>
+                <a:cs typeface="Helvetica"/>
+              </a:rPr>
+              <a:t>axis.</a:t>
+            </a:r>
+          </a:p>
+          <a:p>
+            <a:pPr marL="228600" indent="-228600">
+              <a:buFont typeface="+mj-lt"/>
+              <a:buAutoNum type="arabicPeriod"/>
+            </a:pPr>
+            <a:r>
+              <a:rPr lang="en-US" sz="1000" dirty="0" smtClean="0">
+                <a:latin typeface="Helvetica"/>
+                <a:cs typeface="Helvetica"/>
+              </a:rPr>
+              <a:t>Changing the look of the plot with </a:t>
+            </a:r>
+            <a:r>
+              <a:rPr lang="en-US" sz="1000" b="1" dirty="0" smtClean="0">
+                <a:solidFill>
+                  <a:srgbClr val="D78126"/>
+                </a:solidFill>
+                <a:latin typeface="Helvetica"/>
+                <a:cs typeface="Helvetica"/>
+              </a:rPr>
+              <a:t>custom settings</a:t>
+            </a:r>
+            <a:r>
+              <a:rPr lang="en-US" sz="1000" dirty="0" smtClean="0">
+                <a:latin typeface="Helvetica"/>
+                <a:cs typeface="Helvetica"/>
+              </a:rPr>
+              <a:t>.</a:t>
+            </a:r>
+            <a:endParaRPr lang="en-US" sz="1000" dirty="0" smtClean="0">
+              <a:latin typeface="Helvetica"/>
+              <a:cs typeface="Helvetica"/>
+            </a:endParaRPr>
+          </a:p>
+          <a:p>
+            <a:endParaRPr lang="en-US" sz="1000" b="1" dirty="0">
+              <a:latin typeface="Helvetica"/>
+              <a:cs typeface="Helvetica"/>
+            </a:endParaRPr>
+          </a:p>
+          <a:p>
             <a:r>
               <a:rPr lang="en-US" sz="1000" b="1" dirty="0" smtClean="0">
                 <a:latin typeface="Helvetica"/>
                 <a:cs typeface="Helvetica"/>
               </a:rPr>
-              <a:t>		</a:t>
+              <a:t>Basic </a:t>
             </a:r>
             <a:r>
               <a:rPr lang="en-US" sz="1000" b="1" dirty="0" smtClean="0">
-                <a:solidFill>
-                  <a:srgbClr val="F15E5D"/>
-                </a:solidFill>
                 <a:latin typeface="Helvetica"/>
                 <a:cs typeface="Helvetica"/>
               </a:rPr>
-              <a:t>Dataset</a:t>
+              <a:t>syntax</a:t>
+            </a:r>
+            <a:endParaRPr lang="en-US" sz="1000" dirty="0">
+              <a:latin typeface="Helvetica"/>
+              <a:cs typeface="Helvetica"/>
+            </a:endParaRPr>
+          </a:p>
+          <a:p>
+            <a:r>
+              <a:rPr lang="en-US" sz="1000" dirty="0" smtClean="0">
+                <a:latin typeface="Helvetica"/>
+                <a:cs typeface="Helvetica"/>
+              </a:rPr>
+              <a:t>Use </a:t>
+            </a:r>
+            <a:r>
+              <a:rPr lang="en-US" sz="1000" dirty="0" smtClean="0">
+                <a:latin typeface="Monaco"/>
+                <a:cs typeface="Monaco"/>
+              </a:rPr>
+              <a:t>+</a:t>
+            </a:r>
+            <a:r>
+              <a:rPr lang="en-US" sz="1000" dirty="0" smtClean="0">
+                <a:latin typeface="Helvetica"/>
+                <a:cs typeface="Helvetica"/>
+              </a:rPr>
+              <a:t> to add elements, layers, and custom options.</a:t>
+            </a:r>
+          </a:p>
+          <a:p>
+            <a:r>
+              <a:rPr lang="en-US" sz="1000" b="1" dirty="0" smtClean="0">
+                <a:latin typeface="Helvetica"/>
+                <a:cs typeface="Helvetica"/>
+              </a:rPr>
+              <a:t>	</a:t>
             </a:r>
             <a:endParaRPr lang="en-US" sz="1000" b="1" dirty="0" smtClean="0">
               <a:solidFill>
@@ -12079,7 +12186,7 @@
                 <a:latin typeface="Monaco"/>
                 <a:cs typeface="Monaco"/>
               </a:rPr>
-              <a:t>qplot</a:t>
+              <a:t>ggplot</a:t>
             </a:r>
             <a:r>
               <a:rPr lang="en-US" sz="1000" dirty="0" smtClean="0">
@@ -12087,6 +12194,33 @@
                 <a:cs typeface="Monaco"/>
               </a:rPr>
               <a:t>(</a:t>
+            </a:r>
+            <a:r>
+              <a:rPr lang="en-US" sz="1000" dirty="0" smtClean="0">
+                <a:solidFill>
+                  <a:srgbClr val="F15E5D"/>
+                </a:solidFill>
+                <a:latin typeface="Monaco"/>
+                <a:cs typeface="Monaco"/>
+              </a:rPr>
+              <a:t>data</a:t>
+            </a:r>
+            <a:r>
+              <a:rPr lang="en-US" sz="1000" dirty="0" smtClean="0">
+                <a:latin typeface="Monaco"/>
+                <a:cs typeface="Monaco"/>
+              </a:rPr>
+              <a:t>, </a:t>
+            </a:r>
+            <a:r>
+              <a:rPr lang="en-US" sz="1000" dirty="0" err="1" smtClean="0">
+                <a:solidFill>
+                  <a:srgbClr val="30AE32"/>
+                </a:solidFill>
+                <a:latin typeface="Monaco"/>
+                <a:cs typeface="Monaco"/>
+              </a:rPr>
+              <a:t>aes</a:t>
             </a:r>
             <a:r>
               <a:rPr lang="en-US" sz="1000" dirty="0" smtClean="0">
@@ -12096,234 +12230,17 @@
                 <a:latin typeface="Monaco"/>
                 <a:cs typeface="Monaco"/>
               </a:rPr>
-              <a:t>x = time, y = score</a:t>
-            </a:r>
-            <a:r>
-              <a:rPr lang="en-US" sz="1000" dirty="0" smtClean="0">
-                <a:latin typeface="Monaco"/>
-                <a:cs typeface="Monaco"/>
-              </a:rPr>
-              <a:t>, </a:t>
+              <a:t>(x=IV,</a:t>
             </a:r>
             <a:r>
               <a:rPr lang="en-US" sz="1000" dirty="0" smtClean="0">
                 <a:solidFill>
-                  <a:srgbClr val="F15E5D"/>
+                  <a:srgbClr val="30AE32"/>
                 </a:solidFill>
                 <a:latin typeface="Monaco"/>
                 <a:cs typeface="Monaco"/>
               </a:rPr>
-              <a:t>data = </a:t>
-            </a:r>
-            <a:r>
-              <a:rPr lang="en-US" sz="1000" dirty="0" err="1" smtClean="0">
-                <a:solidFill>
-                  <a:srgbClr val="F15E5D"/>
-                </a:solidFill>
-                <a:latin typeface="Monaco"/>
-                <a:cs typeface="Monaco"/>
-              </a:rPr>
-              <a:t>mydata</a:t>
-            </a:r>
-            <a:r>
-              <a:rPr lang="en-US" sz="1000" dirty="0" smtClean="0">
-                <a:latin typeface="Monaco"/>
-                <a:cs typeface="Monaco"/>
-              </a:rPr>
-              <a:t>, </a:t>
-            </a:r>
-          </a:p>
-          <a:p>
-            <a:r>
-              <a:rPr lang="en-US" sz="1000" dirty="0">
-                <a:latin typeface="Monaco"/>
-                <a:cs typeface="Monaco"/>
-              </a:rPr>
-              <a:t>	</a:t>
-            </a:r>
-            <a:r>
-              <a:rPr lang="en-US" sz="1000" dirty="0" err="1" smtClean="0">
-                <a:solidFill>
-                  <a:srgbClr val="5289FB"/>
-                </a:solidFill>
-                <a:latin typeface="Monaco"/>
-                <a:cs typeface="Monaco"/>
-              </a:rPr>
-              <a:t>geom</a:t>
-            </a:r>
-            <a:r>
-              <a:rPr lang="en-US" sz="1000" dirty="0" smtClean="0">
-                <a:solidFill>
-                  <a:srgbClr val="5289FB"/>
-                </a:solidFill>
-                <a:latin typeface="Monaco"/>
-                <a:cs typeface="Monaco"/>
-              </a:rPr>
-              <a:t> = ‘point’</a:t>
-            </a:r>
-            <a:r>
-              <a:rPr lang="en-US" sz="1000" dirty="0" smtClean="0">
-                <a:latin typeface="Monaco"/>
-                <a:cs typeface="Monaco"/>
-              </a:rPr>
-              <a:t>)</a:t>
-            </a:r>
-          </a:p>
-          <a:p>
-            <a:r>
-              <a:rPr lang="en-US" sz="1000" dirty="0">
-                <a:latin typeface="Monaco"/>
-                <a:cs typeface="Monaco"/>
-              </a:rPr>
-              <a:t>	 </a:t>
-            </a:r>
-            <a:r>
-              <a:rPr lang="en-US" sz="1000" dirty="0" smtClean="0">
-                <a:latin typeface="Monaco"/>
-                <a:cs typeface="Monaco"/>
-              </a:rPr>
-              <a:t>   </a:t>
-            </a:r>
-            <a:r>
-              <a:rPr lang="en-US" sz="1000" b="1" dirty="0" err="1" smtClean="0">
-                <a:solidFill>
-                  <a:srgbClr val="5289FB"/>
-                </a:solidFill>
-                <a:latin typeface="Helvetica"/>
-                <a:cs typeface="Helvetica"/>
-              </a:rPr>
-              <a:t>Geoms</a:t>
-            </a:r>
-            <a:endParaRPr lang="en-US" sz="1000" dirty="0">
-              <a:solidFill>
-                <a:srgbClr val="5289FB"/>
-              </a:solidFill>
-              <a:latin typeface="Helvetica"/>
-              <a:cs typeface="Helvetica"/>
-            </a:endParaRPr>
-          </a:p>
-          <a:p>
-            <a:endParaRPr lang="en-US" sz="1000" b="1" dirty="0" smtClean="0">
-              <a:latin typeface="Helvetica"/>
-              <a:cs typeface="Helvetica"/>
-            </a:endParaRPr>
-          </a:p>
-          <a:p>
-            <a:r>
-              <a:rPr lang="en-US" sz="1000" dirty="0">
-                <a:latin typeface="Helvetica"/>
-                <a:cs typeface="Helvetica"/>
-              </a:rPr>
-              <a:t>Making a plot </a:t>
-            </a:r>
-            <a:r>
-              <a:rPr lang="en-US" sz="1000" dirty="0" smtClean="0">
-                <a:latin typeface="Helvetica"/>
-                <a:cs typeface="Helvetica"/>
-              </a:rPr>
-              <a:t>with </a:t>
-            </a:r>
-            <a:r>
-              <a:rPr lang="en-US" sz="1000" dirty="0" err="1" smtClean="0">
-                <a:latin typeface="Monaco"/>
-                <a:cs typeface="Monaco"/>
-              </a:rPr>
-              <a:t>ggplot</a:t>
-            </a:r>
-            <a:r>
-              <a:rPr lang="en-US" sz="1000" dirty="0" smtClean="0">
-                <a:latin typeface="Helvetica"/>
-                <a:cs typeface="Helvetica"/>
-              </a:rPr>
-              <a:t> </a:t>
-            </a:r>
-            <a:r>
-              <a:rPr lang="en-US" sz="1000" dirty="0">
-                <a:latin typeface="Helvetica"/>
-                <a:cs typeface="Helvetica"/>
-              </a:rPr>
-              <a:t>command </a:t>
-            </a:r>
-            <a:r>
-              <a:rPr lang="en-US" sz="1000" dirty="0" smtClean="0">
-                <a:latin typeface="Helvetica"/>
-                <a:cs typeface="Helvetica"/>
-              </a:rPr>
-              <a:t>provides </a:t>
-            </a:r>
-            <a:r>
-              <a:rPr lang="en-US" sz="1000" dirty="0">
-                <a:latin typeface="Helvetica"/>
-                <a:cs typeface="Helvetica"/>
-              </a:rPr>
-              <a:t>more control. Use </a:t>
-            </a:r>
-            <a:r>
-              <a:rPr lang="en-US" sz="1000" dirty="0">
-                <a:latin typeface="Monaco"/>
-                <a:cs typeface="Monaco"/>
-              </a:rPr>
-              <a:t>+</a:t>
-            </a:r>
-            <a:r>
-              <a:rPr lang="en-US" sz="1000" dirty="0">
-                <a:latin typeface="Helvetica"/>
-                <a:cs typeface="Helvetica"/>
-              </a:rPr>
-              <a:t> to add elements, layers, and custom options.</a:t>
-            </a:r>
-          </a:p>
-          <a:p>
-            <a:endParaRPr lang="en-US" sz="1000" dirty="0" smtClean="0">
-              <a:latin typeface="Monaco"/>
-              <a:cs typeface="Monaco"/>
-            </a:endParaRPr>
-          </a:p>
-          <a:p>
-            <a:r>
-              <a:rPr lang="en-US" sz="1000" dirty="0" err="1" smtClean="0">
-                <a:latin typeface="Monaco"/>
-                <a:cs typeface="Monaco"/>
-              </a:rPr>
-              <a:t>myplot</a:t>
-            </a:r>
-            <a:r>
-              <a:rPr lang="en-US" sz="1000" dirty="0" smtClean="0">
-                <a:latin typeface="Monaco"/>
-                <a:cs typeface="Monaco"/>
-              </a:rPr>
-              <a:t> &lt;- </a:t>
-            </a:r>
-            <a:r>
-              <a:rPr lang="en-US" sz="1000" dirty="0" err="1" smtClean="0">
-                <a:latin typeface="Monaco"/>
-                <a:cs typeface="Monaco"/>
-              </a:rPr>
-              <a:t>ggplot</a:t>
-            </a:r>
-            <a:r>
-              <a:rPr lang="en-US" sz="1000" dirty="0" smtClean="0">
-                <a:latin typeface="Monaco"/>
-                <a:cs typeface="Monaco"/>
-              </a:rPr>
-              <a:t>(</a:t>
-            </a:r>
-            <a:r>
-              <a:rPr lang="en-US" sz="1000" dirty="0" err="1" smtClean="0">
-                <a:solidFill>
-                  <a:srgbClr val="F15E5D"/>
-                </a:solidFill>
-                <a:latin typeface="Monaco"/>
-                <a:cs typeface="Monaco"/>
-              </a:rPr>
-              <a:t>mydata</a:t>
-            </a:r>
-            <a:r>
-              <a:rPr lang="en-US" sz="1000" dirty="0" smtClean="0">
-                <a:latin typeface="Monaco"/>
-                <a:cs typeface="Monaco"/>
-              </a:rPr>
-              <a:t>, </a:t>
+              <a:t> y=DV, color=</a:t>
             </a:r>
             <a:r>
               <a:rPr lang="en-US" sz="1000" dirty="0" err="1" smtClean="0">
@@ -12333,7 +12250,7 @@
                 <a:latin typeface="Monaco"/>
                 <a:cs typeface="Monaco"/>
               </a:rPr>
-              <a:t>aes</a:t>
+              <a:t>cond</a:t>
             </a:r>
             <a:r>
               <a:rPr lang="en-US" sz="1000" dirty="0" smtClean="0">
@@ -12343,23 +12260,50 @@
                 <a:latin typeface="Monaco"/>
                 <a:cs typeface="Monaco"/>
               </a:rPr>
-              <a:t>(time, score)</a:t>
+              <a:t>)</a:t>
             </a:r>
             <a:r>
               <a:rPr lang="en-US" sz="1000" dirty="0" smtClean="0">
                 <a:latin typeface="Monaco"/>
                 <a:cs typeface="Monaco"/>
               </a:rPr>
-              <a:t>) +</a:t>
-            </a:r>
-          </a:p>
-          <a:p>
+              <a:t>)</a:t>
+            </a:r>
+            <a:r>
+              <a:rPr lang="en-US" sz="1000" baseline="30000" dirty="0" smtClean="0">
+                <a:latin typeface="Helvetica"/>
+                <a:cs typeface="Helvetica"/>
+              </a:rPr>
+              <a:t>[1]</a:t>
+            </a:r>
             <a:r>
               <a:rPr lang="en-US" sz="1000" dirty="0" smtClean="0">
                 <a:latin typeface="Monaco"/>
                 <a:cs typeface="Monaco"/>
               </a:rPr>
-              <a:t>	       </a:t>
+              <a:t>+            </a:t>
+            </a:r>
+          </a:p>
+          <a:p>
+            <a:r>
+              <a:rPr lang="en-US" sz="1000" dirty="0">
+                <a:solidFill>
+                  <a:srgbClr val="3366FF"/>
+                </a:solidFill>
+                <a:latin typeface="Monaco"/>
+                <a:cs typeface="Monaco"/>
+              </a:rPr>
+              <a:t>	</a:t>
+            </a:r>
+            <a:r>
+              <a:rPr lang="en-US" sz="1000" dirty="0" smtClean="0">
+                <a:solidFill>
+                  <a:srgbClr val="3366FF"/>
+                </a:solidFill>
+                <a:latin typeface="Monaco"/>
+                <a:cs typeface="Monaco"/>
+              </a:rPr>
+              <a:t>    </a:t>
             </a:r>
             <a:r>
               <a:rPr lang="en-US" sz="1000" dirty="0" err="1" smtClean="0">
@@ -12402,7 +12346,7 @@
                 <a:latin typeface="Monaco"/>
                 <a:cs typeface="Monaco"/>
               </a:rPr>
-              <a:t>      </a:t>
+              <a:t>   </a:t>
             </a:r>
             <a:r>
               <a:rPr lang="en-US" sz="1000" dirty="0" err="1" smtClean="0">
@@ -12422,14 +12366,331 @@
                 <a:latin typeface="Monaco"/>
                 <a:cs typeface="Monaco"/>
               </a:rPr>
-              <a:t>(method = ‘lm’) </a:t>
+              <a:t>(</a:t>
+            </a:r>
+            <a:r>
+              <a:rPr lang="en-US" sz="1000" dirty="0" smtClean="0">
+                <a:solidFill>
+                  <a:srgbClr val="3366FF"/>
+                </a:solidFill>
+                <a:latin typeface="Monaco"/>
+                <a:cs typeface="Monaco"/>
+              </a:rPr>
+              <a:t>method = ‘</a:t>
+            </a:r>
+            <a:r>
+              <a:rPr lang="en-US" sz="1000" dirty="0" smtClean="0">
+                <a:solidFill>
+                  <a:srgbClr val="3366FF"/>
+                </a:solidFill>
+                <a:latin typeface="Monaco"/>
+                <a:cs typeface="Monaco"/>
+              </a:rPr>
+              <a:t>lm’</a:t>
+            </a:r>
+            <a:r>
+              <a:rPr lang="en-US" sz="1000" dirty="0" smtClean="0">
+                <a:solidFill>
+                  <a:srgbClr val="3366FF"/>
+                </a:solidFill>
+                <a:latin typeface="Monaco"/>
+                <a:cs typeface="Monaco"/>
+              </a:rPr>
+              <a:t>)</a:t>
+            </a:r>
+            <a:r>
+              <a:rPr lang="en-US" sz="1000" baseline="30000" dirty="0" smtClean="0">
+                <a:solidFill>
+                  <a:srgbClr val="000000"/>
+                </a:solidFill>
+                <a:latin typeface="Helvetica"/>
+                <a:cs typeface="Helvetica"/>
+              </a:rPr>
+              <a:t>[2]</a:t>
+            </a:r>
+            <a:r>
+              <a:rPr lang="en-US" sz="1000" dirty="0" smtClean="0">
+                <a:solidFill>
+                  <a:srgbClr val="3366FF"/>
+                </a:solidFill>
+                <a:latin typeface="Monaco"/>
+                <a:cs typeface="Monaco"/>
+              </a:rPr>
+              <a:t> </a:t>
             </a:r>
             <a:r>
               <a:rPr lang="en-US" sz="1000" dirty="0" smtClean="0">
                 <a:latin typeface="Monaco"/>
                 <a:cs typeface="Monaco"/>
               </a:rPr>
+              <a:t>+ </a:t>
+            </a:r>
+            <a:r>
+              <a:rPr lang="en-US" sz="1000" b="1" dirty="0">
+                <a:solidFill>
+                  <a:srgbClr val="CB7E1B"/>
+                </a:solidFill>
+                <a:latin typeface="Helvetica"/>
+                <a:cs typeface="Helvetica"/>
+              </a:rPr>
+              <a:t>	</a:t>
+            </a:r>
+            <a:r>
+              <a:rPr lang="en-US" sz="1000" b="1" dirty="0" smtClean="0">
+                <a:solidFill>
+                  <a:srgbClr val="CB7E1B"/>
+                </a:solidFill>
+                <a:latin typeface="Helvetica"/>
+                <a:cs typeface="Helvetica"/>
+              </a:rPr>
+              <a:t>	         </a:t>
+            </a:r>
+            <a:r>
+              <a:rPr lang="en-US" sz="1000" dirty="0" err="1" smtClean="0">
+                <a:solidFill>
+                  <a:srgbClr val="CB7E1B"/>
+                </a:solidFill>
+                <a:latin typeface="Monaco"/>
+                <a:cs typeface="Monaco"/>
+              </a:rPr>
+              <a:t>xlab</a:t>
+            </a:r>
+            <a:r>
+              <a:rPr lang="en-US" sz="1000" dirty="0" smtClean="0">
+                <a:solidFill>
+                  <a:srgbClr val="CB7E1B"/>
+                </a:solidFill>
+                <a:latin typeface="Monaco"/>
+                <a:cs typeface="Monaco"/>
+              </a:rPr>
+              <a:t>(‘Time’) </a:t>
+            </a:r>
+            <a:r>
+              <a:rPr lang="en-US" sz="1000" dirty="0" smtClean="0">
+                <a:latin typeface="Monaco"/>
+                <a:cs typeface="Monaco"/>
+              </a:rPr>
               <a:t>+</a:t>
+            </a:r>
+          </a:p>
+          <a:p>
+            <a:r>
+              <a:rPr lang="en-US" sz="1000" dirty="0">
+                <a:solidFill>
+                  <a:srgbClr val="CB7E1B"/>
+                </a:solidFill>
+                <a:latin typeface="Monaco"/>
+                <a:cs typeface="Monaco"/>
+              </a:rPr>
+              <a:t>	</a:t>
+            </a:r>
+            <a:r>
+              <a:rPr lang="en-US" sz="1000" dirty="0" smtClean="0">
+                <a:solidFill>
+                  <a:srgbClr val="CB7E1B"/>
+                </a:solidFill>
+                <a:latin typeface="Monaco"/>
+                <a:cs typeface="Monaco"/>
+              </a:rPr>
+              <a:t>    </a:t>
+            </a:r>
+            <a:r>
+              <a:rPr lang="en-US" sz="1000" dirty="0" err="1" smtClean="0">
+                <a:solidFill>
+                  <a:srgbClr val="CB7E1B"/>
+                </a:solidFill>
+                <a:latin typeface="Monaco"/>
+                <a:cs typeface="Monaco"/>
+              </a:rPr>
+              <a:t>ylab</a:t>
+            </a:r>
+            <a:r>
+              <a:rPr lang="en-US" sz="1000" dirty="0" smtClean="0">
+                <a:solidFill>
+                  <a:srgbClr val="CB7E1B"/>
+                </a:solidFill>
+                <a:latin typeface="Monaco"/>
+                <a:cs typeface="Monaco"/>
+              </a:rPr>
+              <a:t>(‘Score’)</a:t>
+            </a:r>
+            <a:endParaRPr lang="en-US" sz="1000" dirty="0">
+              <a:solidFill>
+                <a:srgbClr val="CB7E1B"/>
+              </a:solidFill>
+              <a:latin typeface="Helvetica"/>
+              <a:cs typeface="Helvetica"/>
+            </a:endParaRPr>
+          </a:p>
+          <a:p>
+            <a:endParaRPr lang="en-US" sz="1000" b="1" dirty="0" smtClean="0">
+              <a:latin typeface="Helvetica"/>
+              <a:cs typeface="Helvetica"/>
+            </a:endParaRPr>
+          </a:p>
+          <a:p>
+            <a:r>
+              <a:rPr lang="en-US" sz="900" dirty="0" smtClean="0">
+                <a:latin typeface="Helvetica"/>
+                <a:cs typeface="Helvetica"/>
+              </a:rPr>
+              <a:t>[1] </a:t>
+            </a:r>
+            <a:r>
+              <a:rPr lang="en-US" sz="900" dirty="0" smtClean="0">
+                <a:latin typeface="Monaco"/>
+                <a:cs typeface="Monaco"/>
+              </a:rPr>
+              <a:t>color </a:t>
+            </a:r>
+            <a:r>
+              <a:rPr lang="en-US" sz="900" dirty="0" smtClean="0">
+                <a:latin typeface="Helvetica"/>
+                <a:cs typeface="Helvetica"/>
+              </a:rPr>
+              <a:t>color-codes lines and points according to the factor of your choice (here, ‘</a:t>
+            </a:r>
+            <a:r>
+              <a:rPr lang="en-US" sz="900" dirty="0" err="1" smtClean="0">
+                <a:latin typeface="Monaco"/>
+                <a:cs typeface="Monaco"/>
+              </a:rPr>
+              <a:t>cond</a:t>
+            </a:r>
+            <a:r>
+              <a:rPr lang="en-US" sz="900" dirty="0" smtClean="0">
+                <a:latin typeface="Helvetica"/>
+                <a:cs typeface="Helvetica"/>
+              </a:rPr>
+              <a:t>’). </a:t>
+            </a:r>
+            <a:r>
+              <a:rPr lang="en-US" sz="900" dirty="0" smtClean="0">
+                <a:latin typeface="Monaco"/>
+                <a:cs typeface="Monaco"/>
+              </a:rPr>
+              <a:t>fill</a:t>
+            </a:r>
+            <a:r>
+              <a:rPr lang="en-US" sz="900" dirty="0" smtClean="0">
+                <a:latin typeface="Helvetica"/>
+                <a:cs typeface="Helvetica"/>
+              </a:rPr>
+              <a:t> color-codes bars in bar graphs.</a:t>
+            </a:r>
+          </a:p>
+          <a:p>
+            <a:r>
+              <a:rPr lang="en-US" sz="900" dirty="0" smtClean="0">
+                <a:latin typeface="Helvetica"/>
+                <a:cs typeface="Helvetica"/>
+              </a:rPr>
+              <a:t>[2] Each </a:t>
+            </a:r>
+            <a:r>
+              <a:rPr lang="en-US" sz="900" dirty="0" err="1" smtClean="0">
+                <a:latin typeface="Helvetica"/>
+                <a:cs typeface="Helvetica"/>
+              </a:rPr>
+              <a:t>geom</a:t>
+            </a:r>
+            <a:r>
+              <a:rPr lang="en-US" sz="900" dirty="0" smtClean="0">
+                <a:latin typeface="Helvetica"/>
+                <a:cs typeface="Helvetica"/>
+              </a:rPr>
+              <a:t> has custom options available that can be specified as arguments to the </a:t>
+            </a:r>
+            <a:r>
+              <a:rPr lang="en-US" sz="900" dirty="0" err="1" smtClean="0">
+                <a:latin typeface="Helvetica"/>
+                <a:cs typeface="Helvetica"/>
+              </a:rPr>
+              <a:t>geom</a:t>
+            </a:r>
+            <a:r>
+              <a:rPr lang="en-US" sz="900" dirty="0" smtClean="0">
+                <a:latin typeface="Helvetica"/>
+                <a:cs typeface="Helvetica"/>
+              </a:rPr>
+              <a:t> function. Check the documentation!</a:t>
+            </a:r>
+            <a:endParaRPr lang="en-US" sz="900" dirty="0" smtClean="0">
+              <a:latin typeface="Helvetica"/>
+              <a:cs typeface="Helvetica"/>
+            </a:endParaRPr>
+          </a:p>
+          <a:p>
+            <a:endParaRPr lang="en-US" sz="1000" b="1" dirty="0" smtClean="0">
+              <a:latin typeface="Helvetica"/>
+              <a:cs typeface="Helvetica"/>
+            </a:endParaRPr>
+          </a:p>
+          <a:p>
+            <a:r>
+              <a:rPr lang="en-US" sz="1000" b="1" dirty="0" err="1" smtClean="0">
+                <a:latin typeface="Helvetica"/>
+                <a:cs typeface="Helvetica"/>
+              </a:rPr>
+              <a:t>Geoms</a:t>
+            </a:r>
+            <a:endParaRPr lang="en-US" sz="1000" b="1" dirty="0" smtClean="0">
+              <a:latin typeface="Helvetica"/>
+              <a:cs typeface="Helvetica"/>
+            </a:endParaRPr>
+          </a:p>
+          <a:p>
+            <a:r>
+              <a:rPr lang="en-US" sz="1000" dirty="0" smtClean="0">
+                <a:latin typeface="Helvetica"/>
+                <a:cs typeface="Helvetica"/>
+              </a:rPr>
+              <a:t>In the examples below:</a:t>
+            </a:r>
+          </a:p>
+          <a:p>
+            <a:pPr algn="ctr"/>
+            <a:r>
+              <a:rPr lang="en-US" sz="1000" dirty="0" err="1" smtClean="0">
+                <a:latin typeface="Monaco"/>
+                <a:cs typeface="Monaco"/>
+              </a:rPr>
+              <a:t>myplot</a:t>
+            </a:r>
+            <a:r>
+              <a:rPr lang="en-US" sz="1000" dirty="0" smtClean="0">
+                <a:latin typeface="Monaco"/>
+                <a:cs typeface="Monaco"/>
+              </a:rPr>
+              <a:t> &lt;- </a:t>
+            </a:r>
+            <a:r>
+              <a:rPr lang="en-US" sz="1000" dirty="0" err="1" smtClean="0">
+                <a:latin typeface="Monaco"/>
+                <a:cs typeface="Monaco"/>
+              </a:rPr>
+              <a:t>ggplot</a:t>
+            </a:r>
+            <a:r>
+              <a:rPr lang="en-US" sz="1000" dirty="0" smtClean="0">
+                <a:latin typeface="Monaco"/>
+                <a:cs typeface="Monaco"/>
+              </a:rPr>
+              <a:t>(data, </a:t>
+            </a:r>
+            <a:r>
+              <a:rPr lang="en-US" sz="1000" dirty="0" err="1" smtClean="0">
+                <a:latin typeface="Monaco"/>
+                <a:cs typeface="Monaco"/>
+              </a:rPr>
+              <a:t>aes</a:t>
+            </a:r>
+            <a:r>
+              <a:rPr lang="en-US" sz="1000" dirty="0" smtClean="0">
+                <a:latin typeface="Monaco"/>
+                <a:cs typeface="Monaco"/>
+              </a:rPr>
+              <a:t>(x = IV, y  = DV))</a:t>
             </a:r>
             <a:endParaRPr lang="en-US" sz="1000" dirty="0" smtClean="0">
               <a:latin typeface="Monaco"/>
@@ -12437,56 +12698,15 @@
             </a:endParaRPr>
           </a:p>
           <a:p>
-            <a:r>
-              <a:rPr lang="en-US" sz="1000" dirty="0">
-                <a:latin typeface="Monaco"/>
-                <a:cs typeface="Monaco"/>
-              </a:rPr>
-              <a:t>	 </a:t>
-            </a:r>
-            <a:r>
-              <a:rPr lang="en-US" sz="1000" dirty="0" smtClean="0">
-                <a:latin typeface="Monaco"/>
-                <a:cs typeface="Monaco"/>
-              </a:rPr>
-              <a:t>      </a:t>
-            </a:r>
-            <a:r>
-              <a:rPr lang="en-US" sz="1000" dirty="0" err="1" smtClean="0">
-                <a:latin typeface="Monaco"/>
-                <a:cs typeface="Monaco"/>
-              </a:rPr>
-              <a:t>theme_bw</a:t>
-            </a:r>
-            <a:r>
-              <a:rPr lang="en-US" sz="1000" dirty="0" smtClean="0">
-                <a:latin typeface="Monaco"/>
-                <a:cs typeface="Monaco"/>
-              </a:rPr>
-              <a:t>() </a:t>
-            </a:r>
-            <a:r>
-              <a:rPr lang="en-US" sz="1000" dirty="0" smtClean="0">
-                <a:solidFill>
-                  <a:schemeClr val="tx1">
-                    <a:lumMod val="50000"/>
-                    <a:lumOff val="50000"/>
-                  </a:schemeClr>
-                </a:solidFill>
-                <a:latin typeface="Monaco"/>
-                <a:cs typeface="Monaco"/>
-              </a:rPr>
-              <a:t># custom options</a:t>
-            </a:r>
-            <a:endParaRPr lang="en-US" sz="1000" dirty="0">
-              <a:solidFill>
-                <a:schemeClr val="tx1">
-                  <a:lumMod val="50000"/>
-                  <a:lumOff val="50000"/>
-                </a:schemeClr>
-              </a:solidFill>
-              <a:latin typeface="Monaco"/>
-              <a:cs typeface="Monaco"/>
+            <a:endParaRPr lang="en-US" sz="1000" dirty="0" smtClean="0">
+              <a:latin typeface="Helvetica"/>
+              <a:cs typeface="Helvetica"/>
+            </a:endParaRPr>
+          </a:p>
+          <a:p>
+            <a:endParaRPr lang="en-US" sz="1000" dirty="0" smtClean="0">
+              <a:latin typeface="Helvetica"/>
+              <a:cs typeface="Helvetica"/>
             </a:endParaRPr>
           </a:p>
           <a:p>
@@ -12496,12 +12716,138 @@
             </a:endParaRPr>
           </a:p>
           <a:p>
-            <a:r>
-              <a:rPr lang="en-US" sz="1000" b="1" dirty="0" err="1" smtClean="0">
+            <a:endParaRPr lang="en-US" sz="1000" dirty="0" smtClean="0">
+              <a:latin typeface="Helvetica"/>
+              <a:cs typeface="Helvetica"/>
+            </a:endParaRPr>
+          </a:p>
+          <a:p>
+            <a:endParaRPr lang="en-US" sz="1000" dirty="0">
+              <a:latin typeface="Helvetica"/>
+              <a:cs typeface="Helvetica"/>
+            </a:endParaRPr>
+          </a:p>
+          <a:p>
+            <a:endParaRPr lang="en-US" sz="1000" dirty="0" smtClean="0">
+              <a:latin typeface="Helvetica"/>
+              <a:cs typeface="Helvetica"/>
+            </a:endParaRPr>
+          </a:p>
+          <a:p>
+            <a:endParaRPr lang="en-US" sz="1000" dirty="0">
+              <a:latin typeface="Helvetica"/>
+              <a:cs typeface="Helvetica"/>
+            </a:endParaRPr>
+          </a:p>
+          <a:p>
+            <a:endParaRPr lang="en-US" sz="1000" dirty="0" smtClean="0">
+              <a:latin typeface="Helvetica"/>
+              <a:cs typeface="Helvetica"/>
+            </a:endParaRPr>
+          </a:p>
+          <a:p>
+            <a:endParaRPr lang="en-US" sz="1000" dirty="0">
+              <a:latin typeface="Helvetica"/>
+              <a:cs typeface="Helvetica"/>
+            </a:endParaRPr>
+          </a:p>
+          <a:p>
+            <a:endParaRPr lang="en-US" sz="1000" dirty="0" smtClean="0">
+              <a:latin typeface="Helvetica"/>
+              <a:cs typeface="Helvetica"/>
+            </a:endParaRPr>
+          </a:p>
+          <a:p>
+            <a:endParaRPr lang="en-US" sz="1000" dirty="0">
+              <a:latin typeface="Helvetica"/>
+              <a:cs typeface="Helvetica"/>
+            </a:endParaRPr>
+          </a:p>
+          <a:p>
+            <a:endParaRPr lang="en-US" sz="1000" dirty="0" smtClean="0">
+              <a:latin typeface="Helvetica"/>
+              <a:cs typeface="Helvetica"/>
+            </a:endParaRPr>
+          </a:p>
+          <a:p>
+            <a:endParaRPr lang="en-US" sz="1000" dirty="0">
+              <a:latin typeface="Helvetica"/>
+              <a:cs typeface="Helvetica"/>
+            </a:endParaRPr>
+          </a:p>
+          <a:p>
+            <a:endParaRPr lang="en-US" sz="1000" dirty="0" smtClean="0">
+              <a:latin typeface="Helvetica"/>
+              <a:cs typeface="Helvetica"/>
+            </a:endParaRPr>
+          </a:p>
+          <a:p>
+            <a:endParaRPr lang="en-US" sz="1000" dirty="0">
+              <a:latin typeface="Helvetica"/>
+              <a:cs typeface="Helvetica"/>
+            </a:endParaRPr>
+          </a:p>
+          <a:p>
+            <a:endParaRPr lang="en-US" sz="1000" dirty="0" smtClean="0">
+              <a:latin typeface="Helvetica"/>
+              <a:cs typeface="Helvetica"/>
+            </a:endParaRPr>
+          </a:p>
+          <a:p>
+            <a:endParaRPr lang="en-US" sz="1000" dirty="0">
+              <a:latin typeface="Helvetica"/>
+              <a:cs typeface="Helvetica"/>
+            </a:endParaRPr>
+          </a:p>
+          <a:p>
+            <a:endParaRPr lang="en-US" sz="1000" dirty="0" smtClean="0">
+              <a:latin typeface="Helvetica"/>
+              <a:cs typeface="Helvetica"/>
+            </a:endParaRPr>
+          </a:p>
+          <a:p>
+            <a:endParaRPr lang="en-US" sz="1000" dirty="0" smtClean="0">
+              <a:latin typeface="Helvetica"/>
+              <a:cs typeface="Helvetica"/>
+            </a:endParaRPr>
+          </a:p>
+          <a:p>
+            <a:endParaRPr lang="en-US" sz="1000" dirty="0">
+              <a:latin typeface="Helvetica"/>
+              <a:cs typeface="Helvetica"/>
+            </a:endParaRPr>
+          </a:p>
+          <a:p>
+            <a:endParaRPr lang="en-US" sz="1000" dirty="0" smtClean="0">
+              <a:latin typeface="Helvetica"/>
+              <a:cs typeface="Helvetica"/>
+            </a:endParaRPr>
+          </a:p>
+          <a:p>
+            <a:endParaRPr lang="en-US" sz="1000" dirty="0">
+              <a:latin typeface="Helvetica"/>
+              <a:cs typeface="Helvetica"/>
+            </a:endParaRPr>
+          </a:p>
+          <a:p>
+            <a:endParaRPr lang="en-US" sz="1000" dirty="0" smtClean="0">
+              <a:latin typeface="Helvetica"/>
+              <a:cs typeface="Helvetica"/>
+            </a:endParaRPr>
+          </a:p>
+          <a:p>
+            <a:endParaRPr lang="en-US" sz="1000" dirty="0" smtClean="0">
+              <a:latin typeface="Helvetica"/>
+              <a:cs typeface="Helvetica"/>
+            </a:endParaRPr>
+          </a:p>
+          <a:p>
+            <a:r>
+              <a:rPr lang="en-US" sz="1000" b="1" dirty="0" smtClean="0">
                 <a:latin typeface="Helvetica"/>
                 <a:cs typeface="Helvetica"/>
               </a:rPr>
-              <a:t>Geoms</a:t>
+              <a:t>Customization</a:t>
             </a:r>
             <a:endParaRPr lang="en-US" sz="1000" b="1" dirty="0" smtClean="0">
               <a:latin typeface="Helvetica"/>
@@ -12509,273 +12855,254 @@
             </a:endParaRPr>
           </a:p>
           <a:p>
+            <a:pPr>
+              <a:tabLst>
+                <a:tab pos="3314700" algn="r"/>
+              </a:tabLst>
+            </a:pPr>
             <a:r>
               <a:rPr lang="en-US" sz="1000" dirty="0" smtClean="0">
                 <a:latin typeface="Helvetica"/>
                 <a:cs typeface="Helvetica"/>
               </a:rPr>
-              <a:t>[Table with icon, command, available options, notes. Include </a:t>
-            </a:r>
-            <a:r>
-              <a:rPr lang="en-US" sz="1000" dirty="0" err="1" smtClean="0">
-                <a:latin typeface="Helvetica"/>
-                <a:cs typeface="Helvetica"/>
-              </a:rPr>
-              <a:t>geom_density</a:t>
+              <a:t>Adding a </a:t>
             </a:r>
             <a:r>
               <a:rPr lang="en-US" sz="1000" dirty="0" smtClean="0">
                 <a:latin typeface="Helvetica"/>
                 <a:cs typeface="Helvetica"/>
               </a:rPr>
-              <a:t>, </a:t>
+              <a:t>title	</a:t>
             </a:r>
             <a:r>
               <a:rPr lang="en-US" sz="1000" dirty="0" err="1" smtClean="0">
-                <a:latin typeface="Helvetica"/>
-                <a:cs typeface="Helvetica"/>
-              </a:rPr>
-              <a:t>geom_histogram</a:t>
-            </a:r>
+                <a:latin typeface="Monaco"/>
+                <a:cs typeface="Monaco"/>
+              </a:rPr>
+              <a:t>ggtitle</a:t>
+            </a:r>
+            <a:r>
+              <a:rPr lang="en-US" sz="1000" dirty="0" smtClean="0">
+                <a:latin typeface="Monaco"/>
+                <a:cs typeface="Monaco"/>
+              </a:rPr>
+              <a:t>(‘My Plot’)</a:t>
+            </a:r>
+          </a:p>
+          <a:p>
+            <a:pPr>
+              <a:tabLst>
+                <a:tab pos="3314700" algn="r"/>
+              </a:tabLst>
+            </a:pPr>
             <a:r>
               <a:rPr lang="en-US" sz="1000" dirty="0" smtClean="0">
                 <a:latin typeface="Helvetica"/>
                 <a:cs typeface="Helvetica"/>
               </a:rPr>
-              <a:t>, </a:t>
+              <a:t>Label x-axis	</a:t>
             </a:r>
             <a:r>
               <a:rPr lang="en-US" sz="1000" dirty="0" err="1" smtClean="0">
-                <a:latin typeface="Helvetica"/>
-                <a:cs typeface="Helvetica"/>
-              </a:rPr>
-              <a:t>geom_bar</a:t>
-            </a:r>
+                <a:latin typeface="Monaco"/>
+                <a:cs typeface="Monaco"/>
+              </a:rPr>
+              <a:t>xlab</a:t>
+            </a:r>
+            <a:r>
+              <a:rPr lang="en-US" sz="1000" dirty="0" smtClean="0">
+                <a:latin typeface="Monaco"/>
+                <a:cs typeface="Monaco"/>
+              </a:rPr>
+              <a:t>(‘Condition’)</a:t>
+            </a:r>
+          </a:p>
+          <a:p>
+            <a:pPr>
+              <a:tabLst>
+                <a:tab pos="3314700" algn="r"/>
+              </a:tabLst>
+            </a:pPr>
             <a:r>
               <a:rPr lang="en-US" sz="1000" dirty="0" smtClean="0">
                 <a:latin typeface="Helvetica"/>
                 <a:cs typeface="Helvetica"/>
               </a:rPr>
-              <a:t>, </a:t>
+              <a:t>Label y-axis	</a:t>
             </a:r>
             <a:r>
               <a:rPr lang="en-US" sz="1000" dirty="0" err="1" smtClean="0">
-                <a:latin typeface="Helvetica"/>
-                <a:cs typeface="Helvetica"/>
-              </a:rPr>
-              <a:t>geom_jitter</a:t>
-            </a:r>
+                <a:latin typeface="Monaco"/>
+                <a:cs typeface="Monaco"/>
+              </a:rPr>
+              <a:t>ylab</a:t>
+            </a:r>
+            <a:r>
+              <a:rPr lang="en-US" sz="1000" dirty="0" smtClean="0">
+                <a:latin typeface="Monaco"/>
+                <a:cs typeface="Monaco"/>
+              </a:rPr>
+              <a:t>(‘Response’)</a:t>
+            </a:r>
+            <a:endParaRPr lang="en-US" sz="1000" dirty="0" smtClean="0">
+              <a:latin typeface="Monaco"/>
+              <a:cs typeface="Monaco"/>
+            </a:endParaRPr>
+          </a:p>
+          <a:p>
+            <a:pPr>
+              <a:tabLst>
+                <a:tab pos="3314700" algn="r"/>
+              </a:tabLst>
+            </a:pPr>
             <a:r>
               <a:rPr lang="en-US" sz="1000" dirty="0" smtClean="0">
                 <a:latin typeface="Helvetica"/>
                 <a:cs typeface="Helvetica"/>
               </a:rPr>
-              <a:t>, </a:t>
-            </a:r>
-            <a:r>
-              <a:rPr lang="en-US" sz="1000" dirty="0" err="1" smtClean="0">
-                <a:latin typeface="Helvetica"/>
-                <a:cs typeface="Helvetica"/>
-              </a:rPr>
-              <a:t>geom_point</a:t>
-            </a:r>
+              <a:t>Faceting: splits up plot into many plots based on the values of a factor</a:t>
+            </a:r>
+          </a:p>
+          <a:p>
+            <a:pPr>
+              <a:tabLst>
+                <a:tab pos="227013" algn="l"/>
+                <a:tab pos="3314700" algn="r"/>
+              </a:tabLst>
+            </a:pPr>
             <a:r>
               <a:rPr lang="en-US" sz="1000" dirty="0" smtClean="0">
                 <a:latin typeface="Helvetica"/>
                 <a:cs typeface="Helvetica"/>
               </a:rPr>
-              <a:t>, </a:t>
+              <a:t>	By row	</a:t>
             </a:r>
             <a:r>
               <a:rPr lang="en-US" sz="1000" dirty="0" err="1" smtClean="0">
+                <a:latin typeface="Monaco"/>
+                <a:cs typeface="Monaco"/>
+              </a:rPr>
+              <a:t>facet_grid</a:t>
+            </a:r>
+            <a:r>
+              <a:rPr lang="en-US" sz="1000" dirty="0" smtClean="0">
+                <a:latin typeface="Monaco"/>
+                <a:cs typeface="Monaco"/>
+              </a:rPr>
+              <a:t>(gender ~ .)</a:t>
+            </a:r>
+          </a:p>
+          <a:p>
+            <a:pPr>
+              <a:tabLst>
+                <a:tab pos="227013" algn="l"/>
+                <a:tab pos="3314700" algn="r"/>
+              </a:tabLst>
+            </a:pPr>
+            <a:r>
+              <a:rPr lang="en-US" sz="1000" dirty="0">
                 <a:latin typeface="Helvetica"/>
                 <a:cs typeface="Helvetica"/>
               </a:rPr>
-              <a:t>geom_line</a:t>
+              <a:t>	</a:t>
             </a:r>
             <a:r>
               <a:rPr lang="en-US" sz="1000" dirty="0" smtClean="0">
                 <a:latin typeface="Helvetica"/>
                 <a:cs typeface="Helvetica"/>
               </a:rPr>
-              <a:t>, </a:t>
+              <a:t>By column	</a:t>
             </a:r>
             <a:r>
               <a:rPr lang="en-US" sz="1000" dirty="0" err="1" smtClean="0">
-                <a:latin typeface="Helvetica"/>
-                <a:cs typeface="Helvetica"/>
-              </a:rPr>
-              <a:t>geom_smooth</a:t>
-            </a:r>
+                <a:latin typeface="Monaco"/>
+                <a:cs typeface="Monaco"/>
+              </a:rPr>
+              <a:t>facet_grid</a:t>
+            </a:r>
+            <a:r>
+              <a:rPr lang="en-US" sz="1000" dirty="0" smtClean="0">
+                <a:latin typeface="Monaco"/>
+                <a:cs typeface="Monaco"/>
+              </a:rPr>
+              <a:t>(. ~ gender)</a:t>
+            </a:r>
+          </a:p>
+          <a:p>
+            <a:pPr>
+              <a:tabLst>
+                <a:tab pos="227013" algn="l"/>
+                <a:tab pos="3314700" algn="r"/>
+              </a:tabLst>
+            </a:pPr>
             <a:r>
               <a:rPr lang="en-US" sz="1000" dirty="0" smtClean="0">
                 <a:latin typeface="Helvetica"/>
                 <a:cs typeface="Helvetica"/>
               </a:rPr>
-              <a:t>, </a:t>
+              <a:t>	By row &amp; column	</a:t>
             </a:r>
             <a:r>
               <a:rPr lang="en-US" sz="1000" dirty="0" err="1" smtClean="0">
+                <a:latin typeface="Monaco"/>
+                <a:cs typeface="Monaco"/>
+              </a:rPr>
+              <a:t>facet_grid</a:t>
+            </a:r>
+            <a:r>
+              <a:rPr lang="en-US" sz="1000" dirty="0" smtClean="0">
+                <a:latin typeface="Monaco"/>
+                <a:cs typeface="Monaco"/>
+              </a:rPr>
+              <a:t>(age ~ gender)</a:t>
+            </a:r>
+          </a:p>
+          <a:p>
+            <a:pPr>
+              <a:tabLst>
+                <a:tab pos="227013" algn="l"/>
+                <a:tab pos="3314700" algn="r"/>
+              </a:tabLst>
+            </a:pPr>
+            <a:r>
+              <a:rPr lang="en-US" sz="1000" dirty="0">
                 <a:latin typeface="Helvetica"/>
                 <a:cs typeface="Helvetica"/>
               </a:rPr>
-              <a:t>geom_errorbar</a:t>
+              <a:t>	</a:t>
             </a:r>
             <a:r>
               <a:rPr lang="en-US" sz="1000" dirty="0" smtClean="0">
                 <a:latin typeface="Helvetica"/>
                 <a:cs typeface="Helvetica"/>
               </a:rPr>
-              <a:t>]</a:t>
-            </a:r>
-            <a:endParaRPr lang="en-US" sz="1000" dirty="0">
-              <a:latin typeface="Helvetica"/>
-              <a:cs typeface="Helvetica"/>
-            </a:endParaRPr>
-          </a:p>
-          <a:p>
+              <a:t>Wrap facets</a:t>
+            </a:r>
+            <a:r>
+              <a:rPr lang="en-US" sz="1000" dirty="0" smtClean="0">
+                <a:latin typeface="Helvetica"/>
+                <a:cs typeface="Helvetica"/>
+              </a:rPr>
+              <a:t>	</a:t>
+            </a:r>
+            <a:r>
+              <a:rPr lang="en-US" sz="1000" dirty="0" err="1" smtClean="0">
+                <a:latin typeface="Monaco"/>
+                <a:cs typeface="Monaco"/>
+              </a:rPr>
+              <a:t>facet_wrap</a:t>
+            </a:r>
+            <a:r>
+              <a:rPr lang="en-US" sz="1000" dirty="0" smtClean="0">
+                <a:latin typeface="Monaco"/>
+                <a:cs typeface="Monaco"/>
+              </a:rPr>
+              <a:t>(. ~ gender)</a:t>
+            </a:r>
             <a:endParaRPr lang="en-US" sz="1000" dirty="0" smtClean="0">
-              <a:latin typeface="Helvetica"/>
-              <a:cs typeface="Helvetica"/>
-            </a:endParaRPr>
-          </a:p>
-          <a:p>
-            <a:endParaRPr lang="en-US" sz="1000" dirty="0">
               <a:latin typeface="Monaco"/>
               <a:cs typeface="Monaco"/>
             </a:endParaRPr>
-          </a:p>
-          <a:p>
-            <a:r>
-              <a:rPr lang="en-US" sz="1000" b="1" dirty="0" smtClean="0">
-                <a:latin typeface="Helvetica"/>
-                <a:cs typeface="Helvetica"/>
-              </a:rPr>
-              <a:t>Other options</a:t>
-            </a:r>
-          </a:p>
-          <a:p>
-            <a:r>
-              <a:rPr lang="en-US" sz="1000" dirty="0" smtClean="0">
-                <a:latin typeface="Helvetica"/>
-                <a:cs typeface="Helvetica"/>
-              </a:rPr>
-              <a:t>Adding a title</a:t>
-            </a:r>
-          </a:p>
-          <a:p>
-            <a:r>
-              <a:rPr lang="en-US" sz="1000" dirty="0" err="1" smtClean="0">
-                <a:latin typeface="Monaco"/>
-                <a:cs typeface="Monaco"/>
-              </a:rPr>
-              <a:t>myplot</a:t>
-            </a:r>
-            <a:r>
-              <a:rPr lang="en-US" sz="1000" dirty="0" smtClean="0">
-                <a:latin typeface="Monaco"/>
-                <a:cs typeface="Monaco"/>
-              </a:rPr>
-              <a:t> + </a:t>
-            </a:r>
-            <a:r>
-              <a:rPr lang="en-US" sz="1000" dirty="0" err="1" smtClean="0">
-                <a:latin typeface="Monaco"/>
-                <a:cs typeface="Monaco"/>
-              </a:rPr>
-              <a:t>ggtitle</a:t>
-            </a:r>
-            <a:r>
-              <a:rPr lang="en-US" sz="1000" dirty="0" smtClean="0">
-                <a:latin typeface="Monaco"/>
-                <a:cs typeface="Monaco"/>
-              </a:rPr>
-              <a:t>(‘My Plot’)</a:t>
-            </a:r>
-          </a:p>
-          <a:p>
-            <a:r>
-              <a:rPr lang="en-US" sz="1000" dirty="0" smtClean="0">
-                <a:latin typeface="Helvetica"/>
-                <a:cs typeface="Helvetica"/>
-              </a:rPr>
-              <a:t>Changing x- and y-axis labels</a:t>
-            </a:r>
-          </a:p>
-          <a:p>
-            <a:r>
-              <a:rPr lang="en-US" sz="1000" dirty="0" err="1" smtClean="0">
-                <a:latin typeface="Monaco"/>
-                <a:cs typeface="Monaco"/>
-              </a:rPr>
-              <a:t>myplot</a:t>
-            </a:r>
-            <a:r>
-              <a:rPr lang="en-US" sz="1000" dirty="0" smtClean="0">
-                <a:latin typeface="Monaco"/>
-                <a:cs typeface="Monaco"/>
-              </a:rPr>
-              <a:t> + </a:t>
-            </a:r>
-            <a:r>
-              <a:rPr lang="en-US" sz="1000" dirty="0" err="1" smtClean="0">
-                <a:latin typeface="Monaco"/>
-                <a:cs typeface="Monaco"/>
-              </a:rPr>
-              <a:t>xlab</a:t>
-            </a:r>
-            <a:r>
-              <a:rPr lang="en-US" sz="1000" dirty="0" smtClean="0">
-                <a:latin typeface="Monaco"/>
-                <a:cs typeface="Monaco"/>
-              </a:rPr>
-              <a:t>(‘Time’) + </a:t>
-            </a:r>
-            <a:r>
-              <a:rPr lang="en-US" sz="1000" dirty="0" err="1" smtClean="0">
-                <a:latin typeface="Monaco"/>
-                <a:cs typeface="Monaco"/>
-              </a:rPr>
-              <a:t>ylab</a:t>
-            </a:r>
-            <a:r>
-              <a:rPr lang="en-US" sz="1000" dirty="0" smtClean="0">
-                <a:latin typeface="Monaco"/>
-                <a:cs typeface="Monaco"/>
-              </a:rPr>
-              <a:t>(‘Score’)</a:t>
-            </a:r>
-            <a:endParaRPr lang="en-US" sz="1000" b="1" dirty="0" smtClean="0">
-              <a:latin typeface="Monaco"/>
-              <a:cs typeface="Monaco"/>
-            </a:endParaRPr>
-          </a:p>
-          <a:p>
-            <a:r>
-              <a:rPr lang="en-US" sz="1000" dirty="0" smtClean="0">
-                <a:latin typeface="Helvetica"/>
-                <a:cs typeface="Helvetica"/>
-              </a:rPr>
-              <a:t>Faceting</a:t>
-            </a:r>
-          </a:p>
-          <a:p>
-            <a:r>
-              <a:rPr lang="en-US" sz="1000" dirty="0" smtClean="0">
-                <a:latin typeface="Helvetica"/>
-                <a:cs typeface="Helvetica"/>
-              </a:rPr>
-              <a:t>Changing bounds of plot</a:t>
-            </a:r>
-          </a:p>
-          <a:p>
-            <a:r>
-              <a:rPr lang="en-US" sz="1000" dirty="0" smtClean="0">
-                <a:latin typeface="Helvetica"/>
-                <a:cs typeface="Helvetica"/>
-              </a:rPr>
-              <a:t>Changing theme</a:t>
-            </a:r>
           </a:p>
         </p:txBody>
       </p:sp>
@@ -12829,6 +13156,1161 @@
           </a:p>
         </p:txBody>
       </p:sp>
+      <p:graphicFrame>
+        <p:nvGraphicFramePr>
+          <p:cNvPr id="6" name="Table 5"/>
+          <p:cNvGraphicFramePr>
+            <a:graphicFrameLocks noGrp="1"/>
+          </p:cNvGraphicFramePr>
+          <p:nvPr>
+            <p:extLst>
+              <p:ext uri="{D42A27DB-BD31-4B8C-83A1-F6EECF244321}">
+                <p14:modId xmlns:p14="http://schemas.microsoft.com/office/powerpoint/2010/main" val="96463305"/>
+              </p:ext>
+            </p:extLst>
+          </p:nvPr>
+        </p:nvGraphicFramePr>
+        <p:xfrm>
+          <a:off x="302207" y="4581907"/>
+          <a:ext cx="3374268" cy="3566159"/>
+        </p:xfrm>
+        <a:graphic>
+          <a:graphicData uri="http://schemas.openxmlformats.org/drawingml/2006/table">
+            <a:tbl>
+              <a:tblPr firstRow="1" bandRow="1">
+                <a:tableStyleId>{5940675A-B579-460E-94D1-54222C63F5DA}</a:tableStyleId>
+              </a:tblPr>
+              <a:tblGrid>
+                <a:gridCol w="837590"/>
+                <a:gridCol w="2536678"/>
+              </a:tblGrid>
+              <a:tr h="143601">
+                <a:tc>
+                  <a:txBody>
+                    <a:bodyPr/>
+                    <a:lstStyle/>
+                    <a:p>
+                      <a:pPr algn="ctr"/>
+                      <a:r>
+                        <a:rPr lang="en-US" sz="900" b="1" dirty="0" smtClean="0">
+                          <a:latin typeface="Helvetica"/>
+                          <a:cs typeface="Helvetica"/>
+                        </a:rPr>
+                        <a:t>Plot type</a:t>
+                      </a:r>
+                      <a:endParaRPr lang="en-US" sz="900" b="1" dirty="0">
+                        <a:latin typeface="Helvetica"/>
+                        <a:cs typeface="Helvetica"/>
+                      </a:endParaRPr>
+                    </a:p>
+                  </a:txBody>
+                  <a:tcPr>
+                    <a:lnL w="12700" cap="flat" cmpd="sng" algn="ctr">
+                      <a:solidFill>
+                        <a:srgbClr val="FFFFFF"/>
+                      </a:solidFill>
+                      <a:prstDash val="solid"/>
+                      <a:round/>
+                      <a:headEnd type="none" w="med" len="med"/>
+                      <a:tailEnd type="none" w="med" len="med"/>
+                    </a:lnL>
+                    <a:lnR w="12700" cap="flat" cmpd="sng" algn="ctr">
+                      <a:solidFill>
+                        <a:srgbClr val="FFFFFF"/>
+                      </a:solidFill>
+                      <a:prstDash val="solid"/>
+                      <a:round/>
+                      <a:headEnd type="none" w="med" len="med"/>
+                      <a:tailEnd type="none" w="med" len="med"/>
+                    </a:lnR>
+                    <a:lnT w="12700" cap="flat" cmpd="sng" algn="ctr">
+                      <a:solidFill>
+                        <a:srgbClr val="FFFFFF"/>
+                      </a:solidFill>
+                      <a:prstDash val="solid"/>
+                      <a:round/>
+                      <a:headEnd type="none" w="med" len="med"/>
+                      <a:tailEnd type="none" w="med" len="med"/>
+                    </a:lnT>
+                    <a:lnB w="12700" cap="flat" cmpd="sng" algn="ctr">
+                      <a:solidFill>
+                        <a:srgbClr val="FFFFFF"/>
+                      </a:solidFill>
+                      <a:prstDash val="solid"/>
+                      <a:round/>
+                      <a:headEnd type="none" w="med" len="med"/>
+                      <a:tailEnd type="none" w="med" len="med"/>
+                    </a:lnB>
+                    <a:noFill/>
+                  </a:tcPr>
+                </a:tc>
+                <a:tc>
+                  <a:txBody>
+                    <a:bodyPr/>
+                    <a:lstStyle/>
+                    <a:p>
+                      <a:pPr algn="ctr"/>
+                      <a:r>
+                        <a:rPr lang="en-US" sz="900" b="1" dirty="0" smtClean="0">
+                          <a:latin typeface="Helvetica"/>
+                          <a:cs typeface="Helvetica"/>
+                        </a:rPr>
+                        <a:t>Usage &amp; example</a:t>
+                      </a:r>
+                      <a:endParaRPr lang="en-US" sz="900" b="1" dirty="0">
+                        <a:latin typeface="Helvetica"/>
+                        <a:cs typeface="Helvetica"/>
+                      </a:endParaRPr>
+                    </a:p>
+                  </a:txBody>
+                  <a:tcPr>
+                    <a:lnL w="12700" cap="flat" cmpd="sng" algn="ctr">
+                      <a:solidFill>
+                        <a:srgbClr val="FFFFFF"/>
+                      </a:solidFill>
+                      <a:prstDash val="solid"/>
+                      <a:round/>
+                      <a:headEnd type="none" w="med" len="med"/>
+                      <a:tailEnd type="none" w="med" len="med"/>
+                    </a:lnL>
+                    <a:lnR w="12700" cap="flat" cmpd="sng" algn="ctr">
+                      <a:solidFill>
+                        <a:srgbClr val="FFFFFF"/>
+                      </a:solidFill>
+                      <a:prstDash val="solid"/>
+                      <a:round/>
+                      <a:headEnd type="none" w="med" len="med"/>
+                      <a:tailEnd type="none" w="med" len="med"/>
+                    </a:lnR>
+                    <a:lnT w="12700" cap="flat" cmpd="sng" algn="ctr">
+                      <a:solidFill>
+                        <a:srgbClr val="FFFFFF"/>
+                      </a:solidFill>
+                      <a:prstDash val="solid"/>
+                      <a:round/>
+                      <a:headEnd type="none" w="med" len="med"/>
+                      <a:tailEnd type="none" w="med" len="med"/>
+                    </a:lnT>
+                    <a:lnB w="12700" cap="flat" cmpd="sng" algn="ctr">
+                      <a:solidFill>
+                        <a:srgbClr val="FFFFFF"/>
+                      </a:solidFill>
+                      <a:prstDash val="solid"/>
+                      <a:round/>
+                      <a:headEnd type="none" w="med" len="med"/>
+                      <a:tailEnd type="none" w="med" len="med"/>
+                    </a:lnB>
+                    <a:noFill/>
+                  </a:tcPr>
+                </a:tc>
+              </a:tr>
+              <a:tr h="143601">
+                <a:tc>
+                  <a:txBody>
+                    <a:bodyPr/>
+                    <a:lstStyle/>
+                    <a:p>
+                      <a:pPr algn="ctr"/>
+                      <a:r>
+                        <a:rPr lang="en-US" sz="900" b="1" dirty="0" smtClean="0">
+                          <a:latin typeface="Helvetica"/>
+                          <a:cs typeface="Helvetica"/>
+                        </a:rPr>
+                        <a:t>Histogram</a:t>
+                      </a:r>
+                    </a:p>
+                  </a:txBody>
+                  <a:tcPr>
+                    <a:lnL w="12700" cap="flat" cmpd="sng" algn="ctr">
+                      <a:solidFill>
+                        <a:srgbClr val="FFFFFF"/>
+                      </a:solidFill>
+                      <a:prstDash val="solid"/>
+                      <a:round/>
+                      <a:headEnd type="none" w="med" len="med"/>
+                      <a:tailEnd type="none" w="med" len="med"/>
+                    </a:lnL>
+                    <a:lnR w="12700" cap="flat" cmpd="sng" algn="ctr">
+                      <a:solidFill>
+                        <a:srgbClr val="FFFFFF"/>
+                      </a:solidFill>
+                      <a:prstDash val="solid"/>
+                      <a:round/>
+                      <a:headEnd type="none" w="med" len="med"/>
+                      <a:tailEnd type="none" w="med" len="med"/>
+                    </a:lnR>
+                    <a:lnT w="12700" cap="flat" cmpd="sng" algn="ctr">
+                      <a:solidFill>
+                        <a:srgbClr val="FFFFFF"/>
+                      </a:solidFill>
+                      <a:prstDash val="solid"/>
+                      <a:round/>
+                      <a:headEnd type="none" w="med" len="med"/>
+                      <a:tailEnd type="none" w="med" len="med"/>
+                    </a:lnT>
+                    <a:lnB w="12700" cap="flat" cmpd="sng" algn="ctr">
+                      <a:solidFill>
+                        <a:srgbClr val="FFFFFF"/>
+                      </a:solidFill>
+                      <a:prstDash val="solid"/>
+                      <a:round/>
+                      <a:headEnd type="none" w="med" len="med"/>
+                      <a:tailEnd type="none" w="med" len="med"/>
+                    </a:lnB>
+                    <a:solidFill>
+                      <a:schemeClr val="bg1">
+                        <a:lumMod val="85000"/>
+                      </a:schemeClr>
+                    </a:solidFill>
+                  </a:tcPr>
+                </a:tc>
+                <a:tc>
+                  <a:txBody>
+                    <a:bodyPr/>
+                    <a:lstStyle/>
+                    <a:p>
+                      <a:r>
+                        <a:rPr lang="en-US" sz="900" dirty="0" smtClean="0">
+                          <a:latin typeface="Helvetica"/>
+                          <a:cs typeface="Helvetica"/>
+                        </a:rPr>
+                        <a:t>Sorts values in x into bins, shows number of elements in each bin on the y-axis.</a:t>
+                      </a:r>
+                    </a:p>
+                    <a:p>
+                      <a:endParaRPr lang="en-US" sz="900" baseline="0" dirty="0" smtClean="0">
+                        <a:latin typeface="Helvetica"/>
+                        <a:cs typeface="Helvetica"/>
+                      </a:endParaRPr>
+                    </a:p>
+                    <a:p>
+                      <a:r>
+                        <a:rPr lang="en-US" sz="900" baseline="0" dirty="0" err="1" smtClean="0">
+                          <a:latin typeface="Monaco"/>
+                          <a:cs typeface="Monaco"/>
+                        </a:rPr>
+                        <a:t>ggplot</a:t>
+                      </a:r>
+                      <a:r>
+                        <a:rPr lang="en-US" sz="900" baseline="0" dirty="0" smtClean="0">
+                          <a:latin typeface="Monaco"/>
+                          <a:cs typeface="Monaco"/>
+                        </a:rPr>
+                        <a:t>(data, </a:t>
+                      </a:r>
+                      <a:r>
+                        <a:rPr lang="en-US" sz="900" baseline="0" dirty="0" err="1" smtClean="0">
+                          <a:latin typeface="Monaco"/>
+                          <a:cs typeface="Monaco"/>
+                        </a:rPr>
+                        <a:t>aes</a:t>
+                      </a:r>
+                      <a:r>
+                        <a:rPr lang="en-US" sz="900" baseline="0" dirty="0" smtClean="0">
+                          <a:latin typeface="Monaco"/>
+                          <a:cs typeface="Monaco"/>
+                        </a:rPr>
+                        <a:t>(x=age)) +</a:t>
+                      </a:r>
+                    </a:p>
+                    <a:p>
+                      <a:r>
+                        <a:rPr lang="en-US" sz="900" baseline="0" dirty="0" smtClean="0">
+                          <a:latin typeface="Monaco"/>
+                          <a:cs typeface="Monaco"/>
+                        </a:rPr>
+                        <a:t>  </a:t>
+                      </a:r>
+                      <a:r>
+                        <a:rPr lang="en-US" sz="900" baseline="0" dirty="0" err="1" smtClean="0">
+                          <a:latin typeface="Monaco"/>
+                          <a:cs typeface="Monaco"/>
+                        </a:rPr>
+                        <a:t>geom_histogram</a:t>
+                      </a:r>
+                      <a:r>
+                        <a:rPr lang="en-US" sz="900" baseline="0" dirty="0" smtClean="0">
+                          <a:latin typeface="Monaco"/>
+                          <a:cs typeface="Monaco"/>
+                        </a:rPr>
+                        <a:t>(</a:t>
+                      </a:r>
+                      <a:r>
+                        <a:rPr lang="en-US" sz="900" baseline="0" dirty="0" err="1" smtClean="0">
+                          <a:latin typeface="Monaco"/>
+                          <a:cs typeface="Monaco"/>
+                        </a:rPr>
+                        <a:t>binwidth</a:t>
+                      </a:r>
+                      <a:r>
+                        <a:rPr lang="en-US" sz="900" baseline="0" dirty="0" smtClean="0">
+                          <a:latin typeface="Monaco"/>
+                          <a:cs typeface="Monaco"/>
+                        </a:rPr>
+                        <a:t>=5)</a:t>
+                      </a:r>
+                      <a:endParaRPr lang="en-US" sz="900" baseline="0" dirty="0" smtClean="0">
+                        <a:latin typeface="Helvetica"/>
+                        <a:cs typeface="Helvetica"/>
+                      </a:endParaRPr>
+                    </a:p>
+                  </a:txBody>
+                  <a:tcPr>
+                    <a:lnL w="12700" cap="flat" cmpd="sng" algn="ctr">
+                      <a:solidFill>
+                        <a:srgbClr val="FFFFFF"/>
+                      </a:solidFill>
+                      <a:prstDash val="solid"/>
+                      <a:round/>
+                      <a:headEnd type="none" w="med" len="med"/>
+                      <a:tailEnd type="none" w="med" len="med"/>
+                    </a:lnL>
+                    <a:lnR w="12700" cap="flat" cmpd="sng" algn="ctr">
+                      <a:solidFill>
+                        <a:srgbClr val="FFFFFF"/>
+                      </a:solidFill>
+                      <a:prstDash val="solid"/>
+                      <a:round/>
+                      <a:headEnd type="none" w="med" len="med"/>
+                      <a:tailEnd type="none" w="med" len="med"/>
+                    </a:lnR>
+                    <a:lnT w="12700" cap="flat" cmpd="sng" algn="ctr">
+                      <a:solidFill>
+                        <a:srgbClr val="FFFFFF"/>
+                      </a:solidFill>
+                      <a:prstDash val="solid"/>
+                      <a:round/>
+                      <a:headEnd type="none" w="med" len="med"/>
+                      <a:tailEnd type="none" w="med" len="med"/>
+                    </a:lnT>
+                    <a:lnB w="12700" cap="flat" cmpd="sng" algn="ctr">
+                      <a:solidFill>
+                        <a:srgbClr val="FFFFFF"/>
+                      </a:solidFill>
+                      <a:prstDash val="solid"/>
+                      <a:round/>
+                      <a:headEnd type="none" w="med" len="med"/>
+                      <a:tailEnd type="none" w="med" len="med"/>
+                    </a:lnB>
+                    <a:solidFill>
+                      <a:schemeClr val="bg1">
+                        <a:lumMod val="85000"/>
+                      </a:schemeClr>
+                    </a:solidFill>
+                  </a:tcPr>
+                </a:tc>
+              </a:tr>
+              <a:tr h="143601">
+                <a:tc>
+                  <a:txBody>
+                    <a:bodyPr/>
+                    <a:lstStyle/>
+                    <a:p>
+                      <a:pPr algn="ctr"/>
+                      <a:r>
+                        <a:rPr lang="en-US" sz="900" b="1" dirty="0" smtClean="0">
+                          <a:latin typeface="Helvetica"/>
+                          <a:cs typeface="Helvetica"/>
+                        </a:rPr>
+                        <a:t>Bar graph</a:t>
+                      </a:r>
+                    </a:p>
+                  </a:txBody>
+                  <a:tcPr>
+                    <a:lnL w="12700" cap="flat" cmpd="sng" algn="ctr">
+                      <a:solidFill>
+                        <a:srgbClr val="FFFFFF"/>
+                      </a:solidFill>
+                      <a:prstDash val="solid"/>
+                      <a:round/>
+                      <a:headEnd type="none" w="med" len="med"/>
+                      <a:tailEnd type="none" w="med" len="med"/>
+                    </a:lnL>
+                    <a:lnR w="12700" cap="flat" cmpd="sng" algn="ctr">
+                      <a:solidFill>
+                        <a:srgbClr val="FFFFFF"/>
+                      </a:solidFill>
+                      <a:prstDash val="solid"/>
+                      <a:round/>
+                      <a:headEnd type="none" w="med" len="med"/>
+                      <a:tailEnd type="none" w="med" len="med"/>
+                    </a:lnR>
+                    <a:lnT w="12700" cap="flat" cmpd="sng" algn="ctr">
+                      <a:solidFill>
+                        <a:srgbClr val="FFFFFF"/>
+                      </a:solidFill>
+                      <a:prstDash val="solid"/>
+                      <a:round/>
+                      <a:headEnd type="none" w="med" len="med"/>
+                      <a:tailEnd type="none" w="med" len="med"/>
+                    </a:lnT>
+                    <a:lnB w="12700" cap="flat" cmpd="sng" algn="ctr">
+                      <a:solidFill>
+                        <a:srgbClr val="FFFFFF"/>
+                      </a:solidFill>
+                      <a:prstDash val="solid"/>
+                      <a:round/>
+                      <a:headEnd type="none" w="med" len="med"/>
+                      <a:tailEnd type="none" w="med" len="med"/>
+                    </a:lnB>
+                    <a:solidFill>
+                      <a:schemeClr val="bg1">
+                        <a:lumMod val="85000"/>
+                      </a:schemeClr>
+                    </a:solidFill>
+                  </a:tcPr>
+                </a:tc>
+                <a:tc>
+                  <a:txBody>
+                    <a:bodyPr/>
+                    <a:lstStyle/>
+                    <a:p>
+                      <a:r>
+                        <a:rPr lang="en-US" sz="900" dirty="0" smtClean="0">
+                          <a:latin typeface="Helvetica"/>
+                          <a:cs typeface="Helvetica"/>
+                        </a:rPr>
+                        <a:t>Here, x is a factor, and y is a numeric vector of bar heights.</a:t>
+                      </a:r>
+                    </a:p>
+                    <a:p>
+                      <a:endParaRPr lang="en-US" sz="900" dirty="0" smtClean="0">
+                        <a:latin typeface="Helvetica"/>
+                        <a:cs typeface="Helvetica"/>
+                      </a:endParaRPr>
+                    </a:p>
+                    <a:p>
+                      <a:r>
+                        <a:rPr lang="en-US" sz="900" dirty="0" err="1" smtClean="0">
+                          <a:latin typeface="Monaco"/>
+                          <a:cs typeface="Monaco"/>
+                        </a:rPr>
+                        <a:t>myplot</a:t>
+                      </a:r>
+                      <a:r>
+                        <a:rPr lang="en-US" sz="900" baseline="0" dirty="0" smtClean="0">
+                          <a:latin typeface="Monaco"/>
+                          <a:cs typeface="Monaco"/>
+                        </a:rPr>
+                        <a:t> + </a:t>
+                      </a:r>
+                      <a:r>
+                        <a:rPr lang="en-US" sz="900" dirty="0" err="1" smtClean="0">
+                          <a:latin typeface="Monaco"/>
+                          <a:cs typeface="Monaco"/>
+                        </a:rPr>
+                        <a:t>geom_bar</a:t>
+                      </a:r>
+                      <a:r>
+                        <a:rPr lang="en-US" sz="900" dirty="0" smtClean="0">
+                          <a:latin typeface="Monaco"/>
+                          <a:cs typeface="Monaco"/>
+                        </a:rPr>
+                        <a:t>(stat</a:t>
+                      </a:r>
+                      <a:r>
+                        <a:rPr lang="en-US" sz="900" baseline="0" dirty="0" smtClean="0">
+                          <a:latin typeface="Monaco"/>
+                          <a:cs typeface="Monaco"/>
+                        </a:rPr>
+                        <a:t>=‘identity’)</a:t>
+                      </a:r>
+                      <a:endParaRPr lang="en-US" sz="900" dirty="0" smtClean="0">
+                        <a:latin typeface="Monaco"/>
+                        <a:cs typeface="Monaco"/>
+                      </a:endParaRPr>
+                    </a:p>
+                  </a:txBody>
+                  <a:tcPr>
+                    <a:lnL w="12700" cap="flat" cmpd="sng" algn="ctr">
+                      <a:solidFill>
+                        <a:srgbClr val="FFFFFF"/>
+                      </a:solidFill>
+                      <a:prstDash val="solid"/>
+                      <a:round/>
+                      <a:headEnd type="none" w="med" len="med"/>
+                      <a:tailEnd type="none" w="med" len="med"/>
+                    </a:lnL>
+                    <a:lnR w="12700" cap="flat" cmpd="sng" algn="ctr">
+                      <a:solidFill>
+                        <a:srgbClr val="FFFFFF"/>
+                      </a:solidFill>
+                      <a:prstDash val="solid"/>
+                      <a:round/>
+                      <a:headEnd type="none" w="med" len="med"/>
+                      <a:tailEnd type="none" w="med" len="med"/>
+                    </a:lnR>
+                    <a:lnT w="12700" cap="flat" cmpd="sng" algn="ctr">
+                      <a:solidFill>
+                        <a:srgbClr val="FFFFFF"/>
+                      </a:solidFill>
+                      <a:prstDash val="solid"/>
+                      <a:round/>
+                      <a:headEnd type="none" w="med" len="med"/>
+                      <a:tailEnd type="none" w="med" len="med"/>
+                    </a:lnT>
+                    <a:lnB w="12700" cap="flat" cmpd="sng" algn="ctr">
+                      <a:solidFill>
+                        <a:srgbClr val="FFFFFF"/>
+                      </a:solidFill>
+                      <a:prstDash val="solid"/>
+                      <a:round/>
+                      <a:headEnd type="none" w="med" len="med"/>
+                      <a:tailEnd type="none" w="med" len="med"/>
+                    </a:lnB>
+                    <a:solidFill>
+                      <a:schemeClr val="bg1">
+                        <a:lumMod val="85000"/>
+                      </a:schemeClr>
+                    </a:solidFill>
+                  </a:tcPr>
+                </a:tc>
+              </a:tr>
+              <a:tr h="143601">
+                <a:tc>
+                  <a:txBody>
+                    <a:bodyPr/>
+                    <a:lstStyle/>
+                    <a:p>
+                      <a:pPr algn="ctr"/>
+                      <a:r>
+                        <a:rPr lang="en-US" sz="900" b="1" dirty="0" smtClean="0">
+                          <a:latin typeface="Helvetica"/>
+                          <a:cs typeface="Helvetica"/>
+                        </a:rPr>
+                        <a:t>Scatter plot</a:t>
+                      </a:r>
+                      <a:endParaRPr lang="en-US" sz="900" b="1" dirty="0">
+                        <a:latin typeface="Helvetica"/>
+                        <a:cs typeface="Helvetica"/>
+                      </a:endParaRPr>
+                    </a:p>
+                  </a:txBody>
+                  <a:tcPr>
+                    <a:lnL w="12700" cap="flat" cmpd="sng" algn="ctr">
+                      <a:solidFill>
+                        <a:srgbClr val="FFFFFF"/>
+                      </a:solidFill>
+                      <a:prstDash val="solid"/>
+                      <a:round/>
+                      <a:headEnd type="none" w="med" len="med"/>
+                      <a:tailEnd type="none" w="med" len="med"/>
+                    </a:lnL>
+                    <a:lnR w="12700" cap="flat" cmpd="sng" algn="ctr">
+                      <a:solidFill>
+                        <a:srgbClr val="FFFFFF"/>
+                      </a:solidFill>
+                      <a:prstDash val="solid"/>
+                      <a:round/>
+                      <a:headEnd type="none" w="med" len="med"/>
+                      <a:tailEnd type="none" w="med" len="med"/>
+                    </a:lnR>
+                    <a:lnT w="12700" cap="flat" cmpd="sng" algn="ctr">
+                      <a:solidFill>
+                        <a:srgbClr val="FFFFFF"/>
+                      </a:solidFill>
+                      <a:prstDash val="solid"/>
+                      <a:round/>
+                      <a:headEnd type="none" w="med" len="med"/>
+                      <a:tailEnd type="none" w="med" len="med"/>
+                    </a:lnT>
+                    <a:lnB w="12700" cap="flat" cmpd="sng" algn="ctr">
+                      <a:solidFill>
+                        <a:srgbClr val="FFFFFF"/>
+                      </a:solidFill>
+                      <a:prstDash val="solid"/>
+                      <a:round/>
+                      <a:headEnd type="none" w="med" len="med"/>
+                      <a:tailEnd type="none" w="med" len="med"/>
+                    </a:lnB>
+                    <a:solidFill>
+                      <a:schemeClr val="bg1">
+                        <a:lumMod val="85000"/>
+                      </a:schemeClr>
+                    </a:solidFill>
+                  </a:tcPr>
+                </a:tc>
+                <a:tc>
+                  <a:txBody>
+                    <a:bodyPr/>
+                    <a:lstStyle/>
+                    <a:p>
+                      <a:r>
+                        <a:rPr lang="en-US" sz="900" dirty="0" err="1" smtClean="0">
+                          <a:latin typeface="Monaco"/>
+                          <a:cs typeface="Monaco"/>
+                        </a:rPr>
+                        <a:t>geom_jitter</a:t>
+                      </a:r>
+                      <a:r>
+                        <a:rPr lang="en-US" sz="900" baseline="0" dirty="0" smtClean="0">
+                          <a:latin typeface="Monaco"/>
+                          <a:cs typeface="Monaco"/>
+                        </a:rPr>
+                        <a:t> </a:t>
+                      </a:r>
+                      <a:r>
+                        <a:rPr lang="en-US" sz="900" dirty="0" smtClean="0">
+                          <a:latin typeface="Helvetica"/>
+                          <a:cs typeface="Helvetica"/>
+                        </a:rPr>
+                        <a:t>moves points</a:t>
+                      </a:r>
+                      <a:r>
+                        <a:rPr lang="en-US" sz="900" baseline="0" dirty="0" smtClean="0">
+                          <a:latin typeface="Helvetica"/>
+                          <a:cs typeface="Helvetica"/>
+                        </a:rPr>
+                        <a:t> around to avoid </a:t>
+                      </a:r>
+                      <a:r>
+                        <a:rPr lang="en-US" sz="900" baseline="0" dirty="0" err="1" smtClean="0">
+                          <a:latin typeface="Helvetica"/>
+                          <a:cs typeface="Helvetica"/>
+                        </a:rPr>
+                        <a:t>overplotting</a:t>
+                      </a:r>
+                      <a:r>
+                        <a:rPr lang="en-US" sz="900" baseline="0" dirty="0" smtClean="0">
+                          <a:latin typeface="Helvetica"/>
+                          <a:cs typeface="Helvetica"/>
+                        </a:rPr>
+                        <a:t>.</a:t>
+                      </a:r>
+                    </a:p>
+                    <a:p>
+                      <a:endParaRPr lang="en-US" sz="900" dirty="0" smtClean="0">
+                        <a:latin typeface="Helvetica"/>
+                        <a:cs typeface="Helvetica"/>
+                      </a:endParaRPr>
+                    </a:p>
+                    <a:p>
+                      <a:r>
+                        <a:rPr lang="en-US" sz="900" dirty="0" err="1" smtClean="0">
+                          <a:latin typeface="Monaco"/>
+                          <a:cs typeface="Monaco"/>
+                        </a:rPr>
+                        <a:t>myplot</a:t>
+                      </a:r>
+                      <a:r>
+                        <a:rPr lang="en-US" sz="900" baseline="0" dirty="0" smtClean="0">
+                          <a:latin typeface="Monaco"/>
+                          <a:cs typeface="Monaco"/>
+                        </a:rPr>
+                        <a:t> + </a:t>
+                      </a:r>
+                      <a:r>
+                        <a:rPr lang="en-US" sz="900" dirty="0" err="1" smtClean="0">
+                          <a:latin typeface="Monaco"/>
+                          <a:cs typeface="Monaco"/>
+                        </a:rPr>
+                        <a:t>geom_point</a:t>
+                      </a:r>
+                      <a:r>
+                        <a:rPr lang="en-US" sz="900" dirty="0" smtClean="0">
+                          <a:latin typeface="Monaco"/>
+                          <a:cs typeface="Monaco"/>
+                        </a:rPr>
+                        <a:t>()</a:t>
+                      </a:r>
+                    </a:p>
+                    <a:p>
+                      <a:r>
+                        <a:rPr lang="en-US" sz="900" dirty="0" err="1" smtClean="0">
+                          <a:latin typeface="Monaco"/>
+                          <a:cs typeface="Monaco"/>
+                        </a:rPr>
+                        <a:t>myplot</a:t>
+                      </a:r>
+                      <a:r>
+                        <a:rPr lang="en-US" sz="900" dirty="0" smtClean="0">
+                          <a:latin typeface="Monaco"/>
+                          <a:cs typeface="Monaco"/>
+                        </a:rPr>
+                        <a:t> + </a:t>
+                      </a:r>
+                      <a:r>
+                        <a:rPr lang="en-US" sz="900" dirty="0" err="1" smtClean="0">
+                          <a:latin typeface="Monaco"/>
+                          <a:cs typeface="Monaco"/>
+                        </a:rPr>
+                        <a:t>geom_jitter</a:t>
+                      </a:r>
+                      <a:r>
+                        <a:rPr lang="en-US" sz="900" dirty="0" smtClean="0">
+                          <a:latin typeface="Monaco"/>
+                          <a:cs typeface="Monaco"/>
+                        </a:rPr>
+                        <a:t>()</a:t>
+                      </a:r>
+                      <a:endParaRPr lang="en-US" sz="900" dirty="0">
+                        <a:latin typeface="Monaco"/>
+                        <a:cs typeface="Monaco"/>
+                      </a:endParaRPr>
+                    </a:p>
+                  </a:txBody>
+                  <a:tcPr>
+                    <a:lnL w="12700" cap="flat" cmpd="sng" algn="ctr">
+                      <a:solidFill>
+                        <a:srgbClr val="FFFFFF"/>
+                      </a:solidFill>
+                      <a:prstDash val="solid"/>
+                      <a:round/>
+                      <a:headEnd type="none" w="med" len="med"/>
+                      <a:tailEnd type="none" w="med" len="med"/>
+                    </a:lnL>
+                    <a:lnR w="12700" cap="flat" cmpd="sng" algn="ctr">
+                      <a:solidFill>
+                        <a:srgbClr val="FFFFFF"/>
+                      </a:solidFill>
+                      <a:prstDash val="solid"/>
+                      <a:round/>
+                      <a:headEnd type="none" w="med" len="med"/>
+                      <a:tailEnd type="none" w="med" len="med"/>
+                    </a:lnR>
+                    <a:lnT w="12700" cap="flat" cmpd="sng" algn="ctr">
+                      <a:solidFill>
+                        <a:srgbClr val="FFFFFF"/>
+                      </a:solidFill>
+                      <a:prstDash val="solid"/>
+                      <a:round/>
+                      <a:headEnd type="none" w="med" len="med"/>
+                      <a:tailEnd type="none" w="med" len="med"/>
+                    </a:lnT>
+                    <a:lnB w="12700" cap="flat" cmpd="sng" algn="ctr">
+                      <a:solidFill>
+                        <a:srgbClr val="FFFFFF"/>
+                      </a:solidFill>
+                      <a:prstDash val="solid"/>
+                      <a:round/>
+                      <a:headEnd type="none" w="med" len="med"/>
+                      <a:tailEnd type="none" w="med" len="med"/>
+                    </a:lnB>
+                    <a:solidFill>
+                      <a:schemeClr val="bg1">
+                        <a:lumMod val="85000"/>
+                      </a:schemeClr>
+                    </a:solidFill>
+                  </a:tcPr>
+                </a:tc>
+              </a:tr>
+              <a:tr h="143601">
+                <a:tc>
+                  <a:txBody>
+                    <a:bodyPr/>
+                    <a:lstStyle/>
+                    <a:p>
+                      <a:pPr algn="ctr"/>
+                      <a:r>
+                        <a:rPr lang="en-US" sz="900" b="1" dirty="0" smtClean="0">
+                          <a:latin typeface="Helvetica"/>
+                          <a:cs typeface="Helvetica"/>
+                        </a:rPr>
+                        <a:t>Line graph</a:t>
+                      </a:r>
+                      <a:endParaRPr lang="en-US" sz="900" b="1" dirty="0">
+                        <a:latin typeface="Helvetica"/>
+                        <a:cs typeface="Helvetica"/>
+                      </a:endParaRPr>
+                    </a:p>
+                  </a:txBody>
+                  <a:tcPr>
+                    <a:lnL w="12700" cap="flat" cmpd="sng" algn="ctr">
+                      <a:solidFill>
+                        <a:srgbClr val="FFFFFF"/>
+                      </a:solidFill>
+                      <a:prstDash val="solid"/>
+                      <a:round/>
+                      <a:headEnd type="none" w="med" len="med"/>
+                      <a:tailEnd type="none" w="med" len="med"/>
+                    </a:lnL>
+                    <a:lnR w="12700" cap="flat" cmpd="sng" algn="ctr">
+                      <a:solidFill>
+                        <a:srgbClr val="FFFFFF"/>
+                      </a:solidFill>
+                      <a:prstDash val="solid"/>
+                      <a:round/>
+                      <a:headEnd type="none" w="med" len="med"/>
+                      <a:tailEnd type="none" w="med" len="med"/>
+                    </a:lnR>
+                    <a:lnT w="12700" cap="flat" cmpd="sng" algn="ctr">
+                      <a:solidFill>
+                        <a:srgbClr val="FFFFFF"/>
+                      </a:solidFill>
+                      <a:prstDash val="solid"/>
+                      <a:round/>
+                      <a:headEnd type="none" w="med" len="med"/>
+                      <a:tailEnd type="none" w="med" len="med"/>
+                    </a:lnT>
+                    <a:lnB w="12700" cap="flat" cmpd="sng" algn="ctr">
+                      <a:solidFill>
+                        <a:srgbClr val="FFFFFF"/>
+                      </a:solidFill>
+                      <a:prstDash val="solid"/>
+                      <a:round/>
+                      <a:headEnd type="none" w="med" len="med"/>
+                      <a:tailEnd type="none" w="med" len="med"/>
+                    </a:lnB>
+                    <a:solidFill>
+                      <a:schemeClr val="bg1">
+                        <a:lumMod val="85000"/>
+                      </a:schemeClr>
+                    </a:solidFill>
+                  </a:tcPr>
+                </a:tc>
+                <a:tc>
+                  <a:txBody>
+                    <a:bodyPr/>
+                    <a:lstStyle/>
+                    <a:p>
+                      <a:r>
+                        <a:rPr lang="en-US" sz="900" dirty="0" err="1" smtClean="0">
+                          <a:latin typeface="Monaco"/>
+                          <a:cs typeface="Monaco"/>
+                        </a:rPr>
+                        <a:t>myplot</a:t>
+                      </a:r>
+                      <a:r>
+                        <a:rPr lang="en-US" sz="900" dirty="0" smtClean="0">
+                          <a:latin typeface="Monaco"/>
+                          <a:cs typeface="Monaco"/>
+                        </a:rPr>
+                        <a:t> + </a:t>
+                      </a:r>
+                      <a:r>
+                        <a:rPr lang="en-US" sz="900" dirty="0" err="1" smtClean="0">
+                          <a:latin typeface="Monaco"/>
+                          <a:cs typeface="Monaco"/>
+                        </a:rPr>
+                        <a:t>geom_line</a:t>
+                      </a:r>
+                      <a:r>
+                        <a:rPr lang="en-US" sz="900" dirty="0" smtClean="0">
+                          <a:latin typeface="Monaco"/>
+                          <a:cs typeface="Monaco"/>
+                        </a:rPr>
+                        <a:t>()</a:t>
+                      </a:r>
+                      <a:endParaRPr lang="en-US" sz="900" dirty="0">
+                        <a:latin typeface="Monaco"/>
+                        <a:cs typeface="Monaco"/>
+                      </a:endParaRPr>
+                    </a:p>
+                  </a:txBody>
+                  <a:tcPr>
+                    <a:lnL w="12700" cap="flat" cmpd="sng" algn="ctr">
+                      <a:solidFill>
+                        <a:srgbClr val="FFFFFF"/>
+                      </a:solidFill>
+                      <a:prstDash val="solid"/>
+                      <a:round/>
+                      <a:headEnd type="none" w="med" len="med"/>
+                      <a:tailEnd type="none" w="med" len="med"/>
+                    </a:lnL>
+                    <a:lnR w="12700" cap="flat" cmpd="sng" algn="ctr">
+                      <a:solidFill>
+                        <a:srgbClr val="FFFFFF"/>
+                      </a:solidFill>
+                      <a:prstDash val="solid"/>
+                      <a:round/>
+                      <a:headEnd type="none" w="med" len="med"/>
+                      <a:tailEnd type="none" w="med" len="med"/>
+                    </a:lnR>
+                    <a:lnT w="12700" cap="flat" cmpd="sng" algn="ctr">
+                      <a:solidFill>
+                        <a:srgbClr val="FFFFFF"/>
+                      </a:solidFill>
+                      <a:prstDash val="solid"/>
+                      <a:round/>
+                      <a:headEnd type="none" w="med" len="med"/>
+                      <a:tailEnd type="none" w="med" len="med"/>
+                    </a:lnT>
+                    <a:lnB w="12700" cap="flat" cmpd="sng" algn="ctr">
+                      <a:solidFill>
+                        <a:srgbClr val="FFFFFF"/>
+                      </a:solidFill>
+                      <a:prstDash val="solid"/>
+                      <a:round/>
+                      <a:headEnd type="none" w="med" len="med"/>
+                      <a:tailEnd type="none" w="med" len="med"/>
+                    </a:lnB>
+                    <a:solidFill>
+                      <a:schemeClr val="bg1">
+                        <a:lumMod val="85000"/>
+                      </a:schemeClr>
+                    </a:solidFill>
+                  </a:tcPr>
+                </a:tc>
+              </a:tr>
+              <a:tr h="143601">
+                <a:tc>
+                  <a:txBody>
+                    <a:bodyPr/>
+                    <a:lstStyle/>
+                    <a:p>
+                      <a:pPr algn="ctr"/>
+                      <a:r>
+                        <a:rPr lang="en-US" sz="900" b="1" dirty="0" smtClean="0">
+                          <a:latin typeface="Helvetica"/>
+                          <a:cs typeface="Helvetica"/>
+                        </a:rPr>
+                        <a:t>Error bars</a:t>
+                      </a:r>
+                      <a:endParaRPr lang="en-US" sz="900" b="1" dirty="0">
+                        <a:latin typeface="Helvetica"/>
+                        <a:cs typeface="Helvetica"/>
+                      </a:endParaRPr>
+                    </a:p>
+                  </a:txBody>
+                  <a:tcPr>
+                    <a:lnL w="12700" cap="flat" cmpd="sng" algn="ctr">
+                      <a:solidFill>
+                        <a:srgbClr val="FFFFFF"/>
+                      </a:solidFill>
+                      <a:prstDash val="solid"/>
+                      <a:round/>
+                      <a:headEnd type="none" w="med" len="med"/>
+                      <a:tailEnd type="none" w="med" len="med"/>
+                    </a:lnL>
+                    <a:lnR w="12700" cap="flat" cmpd="sng" algn="ctr">
+                      <a:solidFill>
+                        <a:srgbClr val="FFFFFF"/>
+                      </a:solidFill>
+                      <a:prstDash val="solid"/>
+                      <a:round/>
+                      <a:headEnd type="none" w="med" len="med"/>
+                      <a:tailEnd type="none" w="med" len="med"/>
+                    </a:lnR>
+                    <a:lnT w="12700" cap="flat" cmpd="sng" algn="ctr">
+                      <a:solidFill>
+                        <a:srgbClr val="FFFFFF"/>
+                      </a:solidFill>
+                      <a:prstDash val="solid"/>
+                      <a:round/>
+                      <a:headEnd type="none" w="med" len="med"/>
+                      <a:tailEnd type="none" w="med" len="med"/>
+                    </a:lnT>
+                    <a:lnB w="12700" cap="flat" cmpd="sng" algn="ctr">
+                      <a:solidFill>
+                        <a:srgbClr val="FFFFFF"/>
+                      </a:solidFill>
+                      <a:prstDash val="solid"/>
+                      <a:round/>
+                      <a:headEnd type="none" w="med" len="med"/>
+                      <a:tailEnd type="none" w="med" len="med"/>
+                    </a:lnB>
+                    <a:solidFill>
+                      <a:schemeClr val="bg1">
+                        <a:lumMod val="85000"/>
+                      </a:schemeClr>
+                    </a:solidFill>
+                  </a:tcPr>
+                </a:tc>
+                <a:tc>
+                  <a:txBody>
+                    <a:bodyPr/>
+                    <a:lstStyle/>
+                    <a:p>
+                      <a:r>
+                        <a:rPr lang="en-US" sz="900" dirty="0" smtClean="0">
+                          <a:latin typeface="Helvetica"/>
+                          <a:cs typeface="Helvetica"/>
+                        </a:rPr>
+                        <a:t>Use </a:t>
+                      </a:r>
+                      <a:r>
+                        <a:rPr lang="en-US" sz="900" dirty="0" err="1" smtClean="0">
+                          <a:latin typeface="Monaco"/>
+                          <a:cs typeface="Monaco"/>
+                        </a:rPr>
+                        <a:t>ymin</a:t>
+                      </a:r>
+                      <a:r>
+                        <a:rPr lang="en-US" sz="900" baseline="0" dirty="0" smtClean="0">
+                          <a:latin typeface="Helvetica"/>
+                          <a:cs typeface="Helvetica"/>
+                        </a:rPr>
+                        <a:t> and </a:t>
+                      </a:r>
+                      <a:r>
+                        <a:rPr lang="en-US" sz="900" baseline="0" dirty="0" err="1" smtClean="0">
+                          <a:latin typeface="Monaco"/>
+                          <a:cs typeface="Monaco"/>
+                        </a:rPr>
+                        <a:t>ymax</a:t>
+                      </a:r>
+                      <a:r>
+                        <a:rPr lang="en-US" sz="900" baseline="0" dirty="0" smtClean="0">
+                          <a:latin typeface="Helvetica"/>
+                          <a:cs typeface="Helvetica"/>
+                        </a:rPr>
+                        <a:t> to set the bounds and </a:t>
+                      </a:r>
+                      <a:r>
+                        <a:rPr lang="en-US" sz="900" baseline="0" dirty="0" smtClean="0">
+                          <a:latin typeface="Monaco"/>
+                          <a:cs typeface="Monaco"/>
+                        </a:rPr>
+                        <a:t>width</a:t>
+                      </a:r>
+                      <a:r>
+                        <a:rPr lang="en-US" sz="900" baseline="0" dirty="0" smtClean="0">
+                          <a:latin typeface="Helvetica"/>
+                          <a:cs typeface="Helvetica"/>
+                        </a:rPr>
+                        <a:t> to set the width of the bars.</a:t>
+                      </a:r>
+                    </a:p>
+                    <a:p>
+                      <a:endParaRPr lang="en-US" sz="900" baseline="0" dirty="0" smtClean="0">
+                        <a:latin typeface="Helvetica"/>
+                        <a:cs typeface="Helvetica"/>
+                      </a:endParaRPr>
+                    </a:p>
+                    <a:p>
+                      <a:r>
+                        <a:rPr lang="en-US" sz="900" baseline="0" dirty="0" err="1" smtClean="0">
+                          <a:latin typeface="Monaco"/>
+                          <a:cs typeface="Monaco"/>
+                        </a:rPr>
+                        <a:t>myplot</a:t>
+                      </a:r>
+                      <a:r>
+                        <a:rPr lang="en-US" sz="900" baseline="0" dirty="0" smtClean="0">
+                          <a:latin typeface="Monaco"/>
+                          <a:cs typeface="Monaco"/>
+                        </a:rPr>
+                        <a:t> + </a:t>
+                      </a:r>
+                    </a:p>
+                    <a:p>
+                      <a:r>
+                        <a:rPr lang="en-US" sz="900" baseline="0" dirty="0" smtClean="0">
+                          <a:latin typeface="Monaco"/>
+                          <a:cs typeface="Monaco"/>
+                        </a:rPr>
+                        <a:t>   </a:t>
+                      </a:r>
+                      <a:r>
+                        <a:rPr lang="en-US" sz="900" baseline="0" dirty="0" err="1" smtClean="0">
+                          <a:latin typeface="Monaco"/>
+                          <a:cs typeface="Monaco"/>
+                        </a:rPr>
+                        <a:t>geom_errorbar</a:t>
+                      </a:r>
+                      <a:r>
+                        <a:rPr lang="en-US" sz="900" baseline="0" dirty="0" smtClean="0">
+                          <a:latin typeface="Monaco"/>
+                          <a:cs typeface="Monaco"/>
+                        </a:rPr>
+                        <a:t>(</a:t>
+                      </a:r>
+                      <a:r>
+                        <a:rPr lang="en-US" sz="900" baseline="0" dirty="0" err="1" smtClean="0">
+                          <a:latin typeface="Monaco"/>
+                          <a:cs typeface="Monaco"/>
+                        </a:rPr>
+                        <a:t>aes</a:t>
+                      </a:r>
+                      <a:r>
+                        <a:rPr lang="en-US" sz="900" baseline="0" dirty="0" smtClean="0">
+                          <a:latin typeface="Monaco"/>
+                          <a:cs typeface="Monaco"/>
+                        </a:rPr>
+                        <a:t>(</a:t>
+                      </a:r>
+                      <a:r>
+                        <a:rPr lang="en-US" sz="900" baseline="0" dirty="0" err="1" smtClean="0">
+                          <a:latin typeface="Monaco"/>
+                          <a:cs typeface="Monaco"/>
+                        </a:rPr>
+                        <a:t>ymin</a:t>
+                      </a:r>
+                      <a:r>
+                        <a:rPr lang="en-US" sz="900" baseline="0" dirty="0" smtClean="0">
+                          <a:latin typeface="Monaco"/>
+                          <a:cs typeface="Monaco"/>
+                        </a:rPr>
+                        <a:t> = lower, </a:t>
+                      </a:r>
+                    </a:p>
+                    <a:p>
+                      <a:r>
+                        <a:rPr lang="en-US" sz="900" baseline="0" dirty="0" smtClean="0">
+                          <a:latin typeface="Monaco"/>
+                          <a:cs typeface="Monaco"/>
+                        </a:rPr>
+                        <a:t>      </a:t>
+                      </a:r>
+                      <a:r>
+                        <a:rPr lang="en-US" sz="900" baseline="0" dirty="0" err="1" smtClean="0">
+                          <a:latin typeface="Monaco"/>
+                          <a:cs typeface="Monaco"/>
+                        </a:rPr>
+                        <a:t>ymax</a:t>
+                      </a:r>
+                      <a:r>
+                        <a:rPr lang="en-US" sz="900" baseline="0" dirty="0" smtClean="0">
+                          <a:latin typeface="Monaco"/>
+                          <a:cs typeface="Monaco"/>
+                        </a:rPr>
+                        <a:t> = upper), width = 0.1)</a:t>
+                      </a:r>
+                      <a:endParaRPr lang="en-US" sz="900" dirty="0">
+                        <a:latin typeface="Monaco"/>
+                        <a:cs typeface="Monaco"/>
+                      </a:endParaRPr>
+                    </a:p>
+                  </a:txBody>
+                  <a:tcPr>
+                    <a:lnL w="12700" cap="flat" cmpd="sng" algn="ctr">
+                      <a:solidFill>
+                        <a:srgbClr val="FFFFFF"/>
+                      </a:solidFill>
+                      <a:prstDash val="solid"/>
+                      <a:round/>
+                      <a:headEnd type="none" w="med" len="med"/>
+                      <a:tailEnd type="none" w="med" len="med"/>
+                    </a:lnL>
+                    <a:lnR w="12700" cap="flat" cmpd="sng" algn="ctr">
+                      <a:solidFill>
+                        <a:srgbClr val="FFFFFF"/>
+                      </a:solidFill>
+                      <a:prstDash val="solid"/>
+                      <a:round/>
+                      <a:headEnd type="none" w="med" len="med"/>
+                      <a:tailEnd type="none" w="med" len="med"/>
+                    </a:lnR>
+                    <a:lnT w="12700" cap="flat" cmpd="sng" algn="ctr">
+                      <a:solidFill>
+                        <a:srgbClr val="FFFFFF"/>
+                      </a:solidFill>
+                      <a:prstDash val="solid"/>
+                      <a:round/>
+                      <a:headEnd type="none" w="med" len="med"/>
+                      <a:tailEnd type="none" w="med" len="med"/>
+                    </a:lnT>
+                    <a:lnB w="12700" cap="flat" cmpd="sng" algn="ctr">
+                      <a:solidFill>
+                        <a:srgbClr val="FFFFFF"/>
+                      </a:solidFill>
+                      <a:prstDash val="solid"/>
+                      <a:round/>
+                      <a:headEnd type="none" w="med" len="med"/>
+                      <a:tailEnd type="none" w="med" len="med"/>
+                    </a:lnB>
+                    <a:solidFill>
+                      <a:schemeClr val="bg1">
+                        <a:lumMod val="85000"/>
+                      </a:schemeClr>
+                    </a:solidFill>
+                  </a:tcPr>
+                </a:tc>
+              </a:tr>
+            </a:tbl>
+          </a:graphicData>
+        </a:graphic>
+      </p:graphicFrame>
     </p:spTree>
     <p:extLst>
       <p:ext uri="{BB962C8B-B14F-4D97-AF65-F5344CB8AC3E}">

</xml_diff>